<commit_message>
Functionality imporovement: file upload for polar zip data works but needs imporovement. Right now too much hard coded stuff goes into database. I think i can write more code to get details from the json data in the polar zip files. Ill work on that tomorrow
</commit_message>
<xml_diff>
--- a/misc/Life Buddy Web App.pptx
+++ b/misc/Life Buddy Web App.pptx
@@ -11,6 +11,7 @@
     <p:sldId id="259" r:id="rId5"/>
     <p:sldId id="260" r:id="rId6"/>
     <p:sldId id="261" r:id="rId7"/>
+    <p:sldId id="262" r:id="rId8"/>
   </p:sldIdLst>
   <p:sldSz cx="12192000" cy="6858000"/>
   <p:notesSz cx="6858000" cy="9144000"/>
@@ -109,13 +110,18 @@
       </a:defRPr>
     </a:lvl9pPr>
   </p:defaultTextStyle>
+  <p:extLst>
+    <p:ext uri="{EFAFB233-063F-42B5-8137-9DF3F51BA10A}">
+      <p15:sldGuideLst xmlns:p15="http://schemas.microsoft.com/office/powerpoint/2012/main"/>
+    </p:ext>
+  </p:extLst>
 </p:presentation>
 </file>
 
 <file path=ppt/revisionInfo.xml><?xml version="1.0" encoding="utf-8"?>
 <p1510:revInfo xmlns:a="http://schemas.openxmlformats.org/drawingml/2006/main" xmlns:r="http://schemas.openxmlformats.org/officeDocument/2006/relationships" xmlns:p1510="http://schemas.microsoft.com/office/powerpoint/2015/10/main">
   <p1510:revLst>
-    <p1510:client id="{E396DAB5-DBA8-4C3B-B27B-31FB2DF75A1E}" v="5" dt="2021-07-10T12:27:49.022"/>
+    <p1510:client id="{E396DAB5-DBA8-4C3B-B27B-31FB2DF75A1E}" v="8" dt="2021-08-01T09:16:20.224"/>
   </p1510:revLst>
 </p1510:revInfo>
 </file>
@@ -125,7 +131,7 @@
   <pc:docChgLst>
     <pc:chgData name="Nick Rodriguez" userId="60df6d5feed7ac60" providerId="LiveId" clId="{E396DAB5-DBA8-4C3B-B27B-31FB2DF75A1E}"/>
     <pc:docChg chg="undo custSel addSld modSld">
-      <pc:chgData name="Nick Rodriguez" userId="60df6d5feed7ac60" providerId="LiveId" clId="{E396DAB5-DBA8-4C3B-B27B-31FB2DF75A1E}" dt="2021-07-10T12:29:11.728" v="2524" actId="6549"/>
+      <pc:chgData name="Nick Rodriguez" userId="60df6d5feed7ac60" providerId="LiveId" clId="{E396DAB5-DBA8-4C3B-B27B-31FB2DF75A1E}" dt="2021-08-01T09:33:36.812" v="2949" actId="14100"/>
       <pc:docMkLst>
         <pc:docMk/>
       </pc:docMkLst>
@@ -239,8 +245,8 @@
           </ac:spMkLst>
         </pc:spChg>
       </pc:sldChg>
-      <pc:sldChg chg="addSp modSp new mod">
-        <pc:chgData name="Nick Rodriguez" userId="60df6d5feed7ac60" providerId="LiveId" clId="{E396DAB5-DBA8-4C3B-B27B-31FB2DF75A1E}" dt="2021-07-10T12:29:11.728" v="2524" actId="6549"/>
+      <pc:sldChg chg="addSp modSp new mod setBg">
+        <pc:chgData name="Nick Rodriguez" userId="60df6d5feed7ac60" providerId="LiveId" clId="{E396DAB5-DBA8-4C3B-B27B-31FB2DF75A1E}" dt="2021-08-01T09:16:01.095" v="2678"/>
         <pc:sldMkLst>
           <pc:docMk/>
           <pc:sldMk cId="34843305" sldId="261"/>
@@ -254,7 +260,7 @@
           </ac:spMkLst>
         </pc:spChg>
         <pc:spChg chg="mod">
-          <ac:chgData name="Nick Rodriguez" userId="60df6d5feed7ac60" providerId="LiveId" clId="{E396DAB5-DBA8-4C3B-B27B-31FB2DF75A1E}" dt="2021-07-10T12:26:34.098" v="2229" actId="27636"/>
+          <ac:chgData name="Nick Rodriguez" userId="60df6d5feed7ac60" providerId="LiveId" clId="{E396DAB5-DBA8-4C3B-B27B-31FB2DF75A1E}" dt="2021-08-01T08:15:08.029" v="2677" actId="20577"/>
           <ac:spMkLst>
             <pc:docMk/>
             <pc:sldMk cId="34843305" sldId="261"/>
@@ -275,6 +281,29 @@
             <pc:docMk/>
             <pc:sldMk cId="34843305" sldId="261"/>
             <ac:spMk id="5" creationId="{E2302978-4299-4BE6-87E5-0A396DEBDAD0}"/>
+          </ac:spMkLst>
+        </pc:spChg>
+      </pc:sldChg>
+      <pc:sldChg chg="modSp add mod setBg">
+        <pc:chgData name="Nick Rodriguez" userId="60df6d5feed7ac60" providerId="LiveId" clId="{E396DAB5-DBA8-4C3B-B27B-31FB2DF75A1E}" dt="2021-08-01T09:33:36.812" v="2949" actId="14100"/>
+        <pc:sldMkLst>
+          <pc:docMk/>
+          <pc:sldMk cId="182378689" sldId="262"/>
+        </pc:sldMkLst>
+        <pc:spChg chg="mod">
+          <ac:chgData name="Nick Rodriguez" userId="60df6d5feed7ac60" providerId="LiveId" clId="{E396DAB5-DBA8-4C3B-B27B-31FB2DF75A1E}" dt="2021-08-01T09:20:36.072" v="2946" actId="404"/>
+          <ac:spMkLst>
+            <pc:docMk/>
+            <pc:sldMk cId="182378689" sldId="262"/>
+            <ac:spMk id="2" creationId="{E2F8D61A-151A-41D4-ACD1-C7ACE57DA0FE}"/>
+          </ac:spMkLst>
+        </pc:spChg>
+        <pc:spChg chg="mod">
+          <ac:chgData name="Nick Rodriguez" userId="60df6d5feed7ac60" providerId="LiveId" clId="{E396DAB5-DBA8-4C3B-B27B-31FB2DF75A1E}" dt="2021-08-01T09:33:36.812" v="2949" actId="14100"/>
+          <ac:spMkLst>
+            <pc:docMk/>
+            <pc:sldMk cId="182378689" sldId="262"/>
+            <ac:spMk id="3" creationId="{471E5327-8ED1-4525-8025-0617F94784D2}"/>
           </ac:spMkLst>
         </pc:spChg>
       </pc:sldChg>
@@ -430,7 +459,7 @@
           <a:p>
             <a:fld id="{D57D165D-784C-428F-B501-6E9E9CABBFA2}" type="datetimeFigureOut">
               <a:rPr lang="en-US" smtClean="0"/>
-              <a:t>7/10/2021</a:t>
+              <a:t>8/1/2021</a:t>
             </a:fld>
             <a:endParaRPr lang="en-US"/>
           </a:p>
@@ -628,7 +657,7 @@
           <a:p>
             <a:fld id="{D57D165D-784C-428F-B501-6E9E9CABBFA2}" type="datetimeFigureOut">
               <a:rPr lang="en-US" smtClean="0"/>
-              <a:t>7/10/2021</a:t>
+              <a:t>8/1/2021</a:t>
             </a:fld>
             <a:endParaRPr lang="en-US"/>
           </a:p>
@@ -836,7 +865,7 @@
           <a:p>
             <a:fld id="{D57D165D-784C-428F-B501-6E9E9CABBFA2}" type="datetimeFigureOut">
               <a:rPr lang="en-US" smtClean="0"/>
-              <a:t>7/10/2021</a:t>
+              <a:t>8/1/2021</a:t>
             </a:fld>
             <a:endParaRPr lang="en-US"/>
           </a:p>
@@ -1034,7 +1063,7 @@
           <a:p>
             <a:fld id="{D57D165D-784C-428F-B501-6E9E9CABBFA2}" type="datetimeFigureOut">
               <a:rPr lang="en-US" smtClean="0"/>
-              <a:t>7/10/2021</a:t>
+              <a:t>8/1/2021</a:t>
             </a:fld>
             <a:endParaRPr lang="en-US"/>
           </a:p>
@@ -1309,7 +1338,7 @@
           <a:p>
             <a:fld id="{D57D165D-784C-428F-B501-6E9E9CABBFA2}" type="datetimeFigureOut">
               <a:rPr lang="en-US" smtClean="0"/>
-              <a:t>7/10/2021</a:t>
+              <a:t>8/1/2021</a:t>
             </a:fld>
             <a:endParaRPr lang="en-US"/>
           </a:p>
@@ -1574,7 +1603,7 @@
           <a:p>
             <a:fld id="{D57D165D-784C-428F-B501-6E9E9CABBFA2}" type="datetimeFigureOut">
               <a:rPr lang="en-US" smtClean="0"/>
-              <a:t>7/10/2021</a:t>
+              <a:t>8/1/2021</a:t>
             </a:fld>
             <a:endParaRPr lang="en-US"/>
           </a:p>
@@ -1986,7 +2015,7 @@
           <a:p>
             <a:fld id="{D57D165D-784C-428F-B501-6E9E9CABBFA2}" type="datetimeFigureOut">
               <a:rPr lang="en-US" smtClean="0"/>
-              <a:t>7/10/2021</a:t>
+              <a:t>8/1/2021</a:t>
             </a:fld>
             <a:endParaRPr lang="en-US"/>
           </a:p>
@@ -2127,7 +2156,7 @@
           <a:p>
             <a:fld id="{D57D165D-784C-428F-B501-6E9E9CABBFA2}" type="datetimeFigureOut">
               <a:rPr lang="en-US" smtClean="0"/>
-              <a:t>7/10/2021</a:t>
+              <a:t>8/1/2021</a:t>
             </a:fld>
             <a:endParaRPr lang="en-US"/>
           </a:p>
@@ -2240,7 +2269,7 @@
           <a:p>
             <a:fld id="{D57D165D-784C-428F-B501-6E9E9CABBFA2}" type="datetimeFigureOut">
               <a:rPr lang="en-US" smtClean="0"/>
-              <a:t>7/10/2021</a:t>
+              <a:t>8/1/2021</a:t>
             </a:fld>
             <a:endParaRPr lang="en-US"/>
           </a:p>
@@ -2551,7 +2580,7 @@
           <a:p>
             <a:fld id="{D57D165D-784C-428F-B501-6E9E9CABBFA2}" type="datetimeFigureOut">
               <a:rPr lang="en-US" smtClean="0"/>
-              <a:t>7/10/2021</a:t>
+              <a:t>8/1/2021</a:t>
             </a:fld>
             <a:endParaRPr lang="en-US"/>
           </a:p>
@@ -2839,7 +2868,7 @@
           <a:p>
             <a:fld id="{D57D165D-784C-428F-B501-6E9E9CABBFA2}" type="datetimeFigureOut">
               <a:rPr lang="en-US" smtClean="0"/>
-              <a:t>7/10/2021</a:t>
+              <a:t>8/1/2021</a:t>
             </a:fld>
             <a:endParaRPr lang="en-US"/>
           </a:p>
@@ -3080,7 +3109,7 @@
           <a:p>
             <a:fld id="{D57D165D-784C-428F-B501-6E9E9CABBFA2}" type="datetimeFigureOut">
               <a:rPr lang="en-US" smtClean="0"/>
-              <a:t>7/10/2021</a:t>
+              <a:t>8/1/2021</a:t>
             </a:fld>
             <a:endParaRPr lang="en-US"/>
           </a:p>
@@ -5086,6 +5115,16 @@
 <file path=ppt/slides/slide6.xml><?xml version="1.0" encoding="utf-8"?>
 <p:sld xmlns:a="http://schemas.openxmlformats.org/drawingml/2006/main" xmlns:r="http://schemas.openxmlformats.org/officeDocument/2006/relationships" xmlns:p="http://schemas.openxmlformats.org/presentationml/2006/main">
   <p:cSld>
+    <p:bg>
+      <p:bgPr>
+        <a:solidFill>
+          <a:schemeClr val="bg1">
+            <a:lumMod val="95000"/>
+          </a:schemeClr>
+        </a:solidFill>
+        <a:effectLst/>
+      </p:bgPr>
+    </p:bg>
     <p:spTree>
       <p:nvGrpSpPr>
         <p:cNvPr id="1" name=""/>
@@ -5322,21 +5361,48 @@
             <a:pPr lvl="1"/>
             <a:r>
               <a:rPr lang="en-US" sz="900" dirty="0"/>
-              <a:t>Var type (mood, weight, heart rate (instance), activity, etc.,) – LB standardized</a:t>
+              <a:t>Var activity (walking, running, empty is okay for something like mood)</a:t>
             </a:r>
           </a:p>
           <a:p>
             <a:pPr lvl="1"/>
             <a:r>
+              <a:rPr lang="en-US" sz="900" dirty="0" err="1"/>
+              <a:t>var_type</a:t>
+            </a:r>
+            <a:r>
               <a:rPr lang="en-US" sz="900" dirty="0"/>
-              <a:t>Date, hour, min, sec</a:t>
+              <a:t>(mood, weight, heart rate (instance), etc.,) – LB standardized</a:t>
             </a:r>
           </a:p>
           <a:p>
             <a:pPr lvl="1"/>
             <a:r>
+              <a:rPr lang="en-US" sz="900" dirty="0" err="1"/>
+              <a:t>var_datetime_utc</a:t>
+            </a:r>
+            <a:r>
               <a:rPr lang="en-US" sz="900" dirty="0"/>
-              <a:t>Variable [object]</a:t>
+              <a:t> (Date, hour, min, sec converted to </a:t>
+            </a:r>
+            <a:r>
+              <a:rPr lang="en-US" sz="900" dirty="0" err="1"/>
+              <a:t>utc</a:t>
+            </a:r>
+            <a:r>
+              <a:rPr lang="en-US" sz="900" dirty="0"/>
+              <a:t>)</a:t>
+            </a:r>
+          </a:p>
+          <a:p>
+            <a:pPr lvl="1"/>
+            <a:r>
+              <a:rPr lang="en-US" sz="900" dirty="0" err="1"/>
+              <a:t>Var_value</a:t>
+            </a:r>
+            <a:r>
+              <a:rPr lang="en-US" sz="900" dirty="0"/>
+              <a:t> [measurement]</a:t>
             </a:r>
           </a:p>
           <a:p>
@@ -5743,6 +5809,491 @@
     <p:extLst>
       <p:ext uri="{BB962C8B-B14F-4D97-AF65-F5344CB8AC3E}">
         <p14:creationId xmlns:p14="http://schemas.microsoft.com/office/powerpoint/2010/main" val="34843305"/>
+      </p:ext>
+    </p:extLst>
+  </p:cSld>
+  <p:clrMapOvr>
+    <a:masterClrMapping/>
+  </p:clrMapOvr>
+</p:sld>
+</file>
+
+<file path=ppt/slides/slide7.xml><?xml version="1.0" encoding="utf-8"?>
+<p:sld xmlns:a="http://schemas.openxmlformats.org/drawingml/2006/main" xmlns:r="http://schemas.openxmlformats.org/officeDocument/2006/relationships" xmlns:p="http://schemas.openxmlformats.org/presentationml/2006/main">
+  <p:cSld>
+    <p:spTree>
+      <p:nvGrpSpPr>
+        <p:cNvPr id="1" name=""/>
+        <p:cNvGrpSpPr/>
+        <p:nvPr/>
+      </p:nvGrpSpPr>
+      <p:grpSpPr>
+        <a:xfrm>
+          <a:off x="0" y="0"/>
+          <a:ext cx="0" cy="0"/>
+          <a:chOff x="0" y="0"/>
+          <a:chExt cx="0" cy="0"/>
+        </a:xfrm>
+      </p:grpSpPr>
+      <p:sp>
+        <p:nvSpPr>
+          <p:cNvPr id="2" name="Title 1">
+            <a:extLst>
+              <a:ext uri="{FF2B5EF4-FFF2-40B4-BE49-F238E27FC236}">
+                <a16:creationId xmlns:a16="http://schemas.microsoft.com/office/drawing/2014/main" id="{E2F8D61A-151A-41D4-ACD1-C7ACE57DA0FE}"/>
+              </a:ext>
+            </a:extLst>
+          </p:cNvPr>
+          <p:cNvSpPr>
+            <a:spLocks noGrp="1"/>
+          </p:cNvSpPr>
+          <p:nvPr>
+            <p:ph type="title"/>
+          </p:nvPr>
+        </p:nvSpPr>
+        <p:spPr/>
+        <p:txBody>
+          <a:bodyPr/>
+          <a:lstStyle/>
+          <a:p>
+            <a:r>
+              <a:rPr lang="en-US" dirty="0"/>
+              <a:t>Database v2 </a:t>
+            </a:r>
+            <a:r>
+              <a:rPr lang="en-US" sz="2400" dirty="0"/>
+              <a:t>(8/1/2021)</a:t>
+            </a:r>
+            <a:endParaRPr lang="en-US" dirty="0"/>
+          </a:p>
+        </p:txBody>
+      </p:sp>
+      <p:sp>
+        <p:nvSpPr>
+          <p:cNvPr id="3" name="Content Placeholder 2">
+            <a:extLst>
+              <a:ext uri="{FF2B5EF4-FFF2-40B4-BE49-F238E27FC236}">
+                <a16:creationId xmlns:a16="http://schemas.microsoft.com/office/drawing/2014/main" id="{471E5327-8ED1-4525-8025-0617F94784D2}"/>
+              </a:ext>
+            </a:extLst>
+          </p:cNvPr>
+          <p:cNvSpPr>
+            <a:spLocks noGrp="1"/>
+          </p:cNvSpPr>
+          <p:nvPr>
+            <p:ph idx="1"/>
+          </p:nvPr>
+        </p:nvSpPr>
+        <p:spPr>
+          <a:xfrm>
+            <a:off x="838200" y="1359281"/>
+            <a:ext cx="10515600" cy="3933265"/>
+          </a:xfrm>
+        </p:spPr>
+        <p:txBody>
+          <a:bodyPr numCol="2">
+            <a:normAutofit/>
+          </a:bodyPr>
+          <a:lstStyle/>
+          <a:p>
+            <a:r>
+              <a:rPr lang="en-US" sz="1000" dirty="0"/>
+              <a:t>User table</a:t>
+            </a:r>
+          </a:p>
+          <a:p>
+            <a:pPr lvl="1"/>
+            <a:r>
+              <a:rPr lang="en-US" sz="900" dirty="0"/>
+              <a:t>Username</a:t>
+            </a:r>
+          </a:p>
+          <a:p>
+            <a:pPr lvl="1"/>
+            <a:r>
+              <a:rPr lang="en-US" sz="900" dirty="0"/>
+              <a:t>Email</a:t>
+            </a:r>
+          </a:p>
+          <a:p>
+            <a:pPr lvl="1"/>
+            <a:r>
+              <a:rPr lang="en-US" sz="900" dirty="0"/>
+              <a:t>Password</a:t>
+            </a:r>
+          </a:p>
+          <a:p>
+            <a:pPr lvl="1"/>
+            <a:r>
+              <a:rPr lang="en-US" sz="900" dirty="0"/>
+              <a:t>Permission (view nick’s data?)</a:t>
+            </a:r>
+          </a:p>
+          <a:p>
+            <a:pPr lvl="1"/>
+            <a:r>
+              <a:rPr lang="en-US" sz="900" dirty="0"/>
+              <a:t>Profile image</a:t>
+            </a:r>
+          </a:p>
+          <a:p>
+            <a:pPr lvl="1"/>
+            <a:r>
+              <a:rPr lang="en-US" sz="900" dirty="0"/>
+              <a:t>Time stamp registered</a:t>
+            </a:r>
+          </a:p>
+          <a:p>
+            <a:pPr lvl="1"/>
+            <a:r>
+              <a:rPr lang="en-US" sz="900" dirty="0"/>
+              <a:t>User </a:t>
+            </a:r>
+            <a:r>
+              <a:rPr lang="en-US" sz="900" dirty="0" err="1"/>
+              <a:t>timezone</a:t>
+            </a:r>
+            <a:endParaRPr lang="en-US" sz="900" dirty="0"/>
+          </a:p>
+          <a:p>
+            <a:r>
+              <a:rPr lang="en-US" sz="1000" dirty="0"/>
+              <a:t>Variable Table</a:t>
+            </a:r>
+          </a:p>
+          <a:p>
+            <a:pPr lvl="1"/>
+            <a:r>
+              <a:rPr lang="en-US" sz="900" dirty="0"/>
+              <a:t>Id</a:t>
+            </a:r>
+          </a:p>
+          <a:p>
+            <a:pPr lvl="1"/>
+            <a:r>
+              <a:rPr lang="en-US" sz="900" dirty="0" err="1"/>
+              <a:t>User_id</a:t>
+            </a:r>
+            <a:r>
+              <a:rPr lang="en-US" sz="900" dirty="0"/>
+              <a:t> (foreign key)</a:t>
+            </a:r>
+          </a:p>
+          <a:p>
+            <a:pPr lvl="1"/>
+            <a:r>
+              <a:rPr lang="en-US" sz="900" dirty="0"/>
+              <a:t>Var activity (walking, running, empty is okay for something like mood)</a:t>
+            </a:r>
+          </a:p>
+          <a:p>
+            <a:pPr lvl="1"/>
+            <a:r>
+              <a:rPr lang="en-US" sz="900" dirty="0" err="1"/>
+              <a:t>var_type</a:t>
+            </a:r>
+            <a:r>
+              <a:rPr lang="en-US" sz="900" dirty="0"/>
+              <a:t> (mood, weight, heart rate (instance), etc.,) – LB standardized</a:t>
+            </a:r>
+          </a:p>
+          <a:p>
+            <a:pPr lvl="1"/>
+            <a:r>
+              <a:rPr lang="en-US" sz="900" dirty="0" err="1"/>
+              <a:t>var_datetime_utc</a:t>
+            </a:r>
+            <a:r>
+              <a:rPr lang="en-US" sz="900" dirty="0"/>
+              <a:t>  (Date, hour, min, sec converted to </a:t>
+            </a:r>
+            <a:r>
+              <a:rPr lang="en-US" sz="900" dirty="0" err="1"/>
+              <a:t>utc</a:t>
+            </a:r>
+            <a:r>
+              <a:rPr lang="en-US" sz="900" dirty="0"/>
+              <a:t>)</a:t>
+            </a:r>
+          </a:p>
+          <a:p>
+            <a:pPr lvl="1"/>
+            <a:r>
+              <a:rPr lang="en-US" sz="900" dirty="0" err="1"/>
+              <a:t>Var_periodicity</a:t>
+            </a:r>
+            <a:r>
+              <a:rPr lang="en-US" sz="900" dirty="0"/>
+              <a:t> – days, seconds (</a:t>
+            </a:r>
+            <a:r>
+              <a:rPr lang="en-US" sz="900" dirty="0" err="1"/>
+              <a:t>i.e</a:t>
+            </a:r>
+            <a:r>
+              <a:rPr lang="en-US" sz="900" dirty="0"/>
+              <a:t> what are the measurements in – maybe redundant to </a:t>
+            </a:r>
+            <a:r>
+              <a:rPr lang="en-US" sz="900" dirty="0" err="1"/>
+              <a:t>var_unit</a:t>
+            </a:r>
+            <a:r>
+              <a:rPr lang="en-US" sz="900" dirty="0"/>
+              <a:t>?)</a:t>
+            </a:r>
+          </a:p>
+          <a:p>
+            <a:pPr lvl="1"/>
+            <a:r>
+              <a:rPr lang="en-US" sz="900" dirty="0" err="1"/>
+              <a:t>Var_value</a:t>
+            </a:r>
+            <a:r>
+              <a:rPr lang="en-US" sz="900" dirty="0"/>
+              <a:t> [measurement]</a:t>
+            </a:r>
+          </a:p>
+          <a:p>
+            <a:pPr lvl="1"/>
+            <a:r>
+              <a:rPr lang="en-US" sz="900" dirty="0" err="1"/>
+              <a:t>var_unit</a:t>
+            </a:r>
+            <a:r>
+              <a:rPr lang="en-US" sz="900" dirty="0"/>
+              <a:t>– LB will standardize across data sets</a:t>
+            </a:r>
+          </a:p>
+          <a:p>
+            <a:pPr lvl="1"/>
+            <a:r>
+              <a:rPr lang="en-US" sz="900" dirty="0" err="1"/>
+              <a:t>var_timezone_utc_delta_in_mins</a:t>
+            </a:r>
+            <a:r>
+              <a:rPr lang="en-US" sz="900" dirty="0"/>
+              <a:t> = </a:t>
+            </a:r>
+            <a:r>
+              <a:rPr lang="en-US" sz="900" dirty="0" err="1"/>
+              <a:t>db.Column</a:t>
+            </a:r>
+            <a:r>
+              <a:rPr lang="en-US" sz="900" dirty="0"/>
+              <a:t>(</a:t>
+            </a:r>
+            <a:r>
+              <a:rPr lang="en-US" sz="900" dirty="0" err="1"/>
+              <a:t>db.Float</a:t>
+            </a:r>
+            <a:r>
+              <a:rPr lang="en-US" sz="900" dirty="0"/>
+              <a:t>) #difference </a:t>
+            </a:r>
+            <a:r>
+              <a:rPr lang="en-US" sz="900" dirty="0" err="1"/>
+              <a:t>bewteen</a:t>
+            </a:r>
+            <a:r>
+              <a:rPr lang="en-US" sz="900" dirty="0"/>
+              <a:t> </a:t>
+            </a:r>
+            <a:r>
+              <a:rPr lang="en-US" sz="900" dirty="0" err="1"/>
+              <a:t>utc</a:t>
+            </a:r>
+            <a:r>
+              <a:rPr lang="en-US" sz="900" dirty="0"/>
+              <a:t> and </a:t>
+            </a:r>
+            <a:r>
+              <a:rPr lang="en-US" sz="900" dirty="0" err="1"/>
+              <a:t>timezone</a:t>
+            </a:r>
+            <a:r>
+              <a:rPr lang="en-US" sz="900" dirty="0"/>
+              <a:t> of exercise</a:t>
+            </a:r>
+          </a:p>
+          <a:p>
+            <a:pPr lvl="1"/>
+            <a:r>
+              <a:rPr lang="en-US" sz="900" dirty="0" err="1"/>
+              <a:t>time_stamp_utc</a:t>
+            </a:r>
+            <a:r>
+              <a:rPr lang="en-US" sz="900" dirty="0"/>
+              <a:t> – time stamp of entry </a:t>
+            </a:r>
+          </a:p>
+          <a:p>
+            <a:pPr lvl="1"/>
+            <a:endParaRPr lang="en-US" sz="900" dirty="0"/>
+          </a:p>
+          <a:p>
+            <a:r>
+              <a:rPr lang="en-US" sz="1000" dirty="0"/>
+              <a:t>Posts Table</a:t>
+            </a:r>
+          </a:p>
+          <a:p>
+            <a:pPr lvl="1"/>
+            <a:endParaRPr lang="en-US" sz="900" dirty="0"/>
+          </a:p>
+        </p:txBody>
+      </p:sp>
+      <p:sp>
+        <p:nvSpPr>
+          <p:cNvPr id="4" name="TextBox 3">
+            <a:extLst>
+              <a:ext uri="{FF2B5EF4-FFF2-40B4-BE49-F238E27FC236}">
+                <a16:creationId xmlns:a16="http://schemas.microsoft.com/office/drawing/2014/main" id="{16AC410D-4FDE-4ECD-8104-91DD87EC4AB5}"/>
+              </a:ext>
+            </a:extLst>
+          </p:cNvPr>
+          <p:cNvSpPr txBox="1"/>
+          <p:nvPr/>
+        </p:nvSpPr>
+        <p:spPr>
+          <a:xfrm>
+            <a:off x="335280" y="5292546"/>
+            <a:ext cx="5590032" cy="1200329"/>
+          </a:xfrm>
+          <a:prstGeom prst="rect">
+            <a:avLst/>
+          </a:prstGeom>
+          <a:noFill/>
+        </p:spPr>
+        <p:txBody>
+          <a:bodyPr wrap="square" rtlCol="0">
+            <a:spAutoFit/>
+          </a:bodyPr>
+          <a:lstStyle/>
+          <a:p>
+            <a:r>
+              <a:rPr lang="en-US" dirty="0"/>
+              <a:t>Data upload processing steps:</a:t>
+            </a:r>
+          </a:p>
+          <a:p>
+            <a:pPr marL="342900" indent="-342900">
+              <a:buFont typeface="+mj-lt"/>
+              <a:buAutoNum type="arabicPeriod"/>
+            </a:pPr>
+            <a:r>
+              <a:rPr lang="en-US" dirty="0"/>
+              <a:t>Data gets uploaded through web or phone app. </a:t>
+            </a:r>
+          </a:p>
+          <a:p>
+            <a:pPr marL="342900" indent="-342900">
+              <a:buFont typeface="+mj-lt"/>
+              <a:buAutoNum type="arabicPeriod"/>
+            </a:pPr>
+            <a:r>
+              <a:rPr lang="en-US" dirty="0"/>
+              <a:t>Backend converts the input data to fit in Variable table via pandas </a:t>
+            </a:r>
+            <a:r>
+              <a:rPr lang="en-US" dirty="0" err="1"/>
+              <a:t>dataframe</a:t>
+            </a:r>
+            <a:r>
+              <a:rPr lang="en-US" dirty="0"/>
+              <a:t>. </a:t>
+            </a:r>
+          </a:p>
+        </p:txBody>
+      </p:sp>
+      <p:sp>
+        <p:nvSpPr>
+          <p:cNvPr id="5" name="TextBox 4">
+            <a:extLst>
+              <a:ext uri="{FF2B5EF4-FFF2-40B4-BE49-F238E27FC236}">
+                <a16:creationId xmlns:a16="http://schemas.microsoft.com/office/drawing/2014/main" id="{E2302978-4299-4BE6-87E5-0A396DEBDAD0}"/>
+              </a:ext>
+            </a:extLst>
+          </p:cNvPr>
+          <p:cNvSpPr txBox="1"/>
+          <p:nvPr/>
+        </p:nvSpPr>
+        <p:spPr>
+          <a:xfrm>
+            <a:off x="6275832" y="5310834"/>
+            <a:ext cx="5580888" cy="1200329"/>
+          </a:xfrm>
+          <a:prstGeom prst="rect">
+            <a:avLst/>
+          </a:prstGeom>
+          <a:noFill/>
+        </p:spPr>
+        <p:txBody>
+          <a:bodyPr wrap="square" rtlCol="0">
+            <a:spAutoFit/>
+          </a:bodyPr>
+          <a:lstStyle/>
+          <a:p>
+            <a:r>
+              <a:rPr lang="en-US" dirty="0"/>
+              <a:t>Data report processing steps:</a:t>
+            </a:r>
+          </a:p>
+          <a:p>
+            <a:pPr marL="342900" indent="-342900">
+              <a:buFont typeface="+mj-lt"/>
+              <a:buAutoNum type="arabicPeriod"/>
+            </a:pPr>
+            <a:r>
+              <a:rPr lang="en-US" dirty="0"/>
+              <a:t>Collect data from database into </a:t>
+            </a:r>
+            <a:r>
+              <a:rPr lang="en-US" dirty="0" err="1"/>
+              <a:t>dataframe</a:t>
+            </a:r>
+            <a:r>
+              <a:rPr lang="en-US" dirty="0"/>
+              <a:t>.</a:t>
+            </a:r>
+          </a:p>
+          <a:p>
+            <a:pPr marL="342900" indent="-342900">
+              <a:buFont typeface="+mj-lt"/>
+              <a:buAutoNum type="arabicPeriod"/>
+            </a:pPr>
+            <a:r>
+              <a:rPr lang="en-US" dirty="0"/>
+              <a:t>Convert </a:t>
+            </a:r>
+            <a:r>
+              <a:rPr lang="en-US" dirty="0" err="1"/>
+              <a:t>dataframe</a:t>
+            </a:r>
+            <a:r>
+              <a:rPr lang="en-US" dirty="0"/>
+              <a:t> to format for chart, table or </a:t>
+            </a:r>
+            <a:r>
+              <a:rPr lang="en-US" dirty="0" err="1"/>
+              <a:t>excelt</a:t>
+            </a:r>
+            <a:r>
+              <a:rPr lang="en-US" dirty="0"/>
+              <a:t> </a:t>
+            </a:r>
+            <a:r>
+              <a:rPr lang="en-US"/>
+              <a:t>report.</a:t>
+            </a:r>
+            <a:endParaRPr lang="en-US" dirty="0"/>
+          </a:p>
+        </p:txBody>
+      </p:sp>
+    </p:spTree>
+    <p:extLst>
+      <p:ext uri="{BB962C8B-B14F-4D97-AF65-F5344CB8AC3E}">
+        <p14:creationId xmlns:p14="http://schemas.microsoft.com/office/powerpoint/2010/main" val="182378689"/>
       </p:ext>
     </p:extLst>
   </p:cSld>

</xml_diff>

<commit_message>
Analysis: mostly trying to figure out how to use scipy
</commit_message>
<xml_diff>
--- a/misc/Life Buddy Web App.pptx
+++ b/misc/Life Buddy Web App.pptx
@@ -12,6 +12,8 @@
     <p:sldId id="260" r:id="rId6"/>
     <p:sldId id="261" r:id="rId7"/>
     <p:sldId id="262" r:id="rId8"/>
+    <p:sldId id="264" r:id="rId9"/>
+    <p:sldId id="263" r:id="rId10"/>
   </p:sldIdLst>
   <p:sldSz cx="12192000" cy="6858000"/>
   <p:notesSz cx="6858000" cy="9144000"/>
@@ -121,7 +123,7 @@
 <file path=ppt/revisionInfo.xml><?xml version="1.0" encoding="utf-8"?>
 <p1510:revInfo xmlns:a="http://schemas.openxmlformats.org/drawingml/2006/main" xmlns:r="http://schemas.openxmlformats.org/officeDocument/2006/relationships" xmlns:p1510="http://schemas.microsoft.com/office/powerpoint/2015/10/main">
   <p1510:revLst>
-    <p1510:client id="{E396DAB5-DBA8-4C3B-B27B-31FB2DF75A1E}" v="8" dt="2021-08-01T09:16:20.224"/>
+    <p1510:client id="{E396DAB5-DBA8-4C3B-B27B-31FB2DF75A1E}" v="229" dt="2021-08-06T14:14:20.321"/>
   </p1510:revLst>
 </p1510:revInfo>
 </file>
@@ -131,7 +133,7 @@
   <pc:docChgLst>
     <pc:chgData name="Nick Rodriguez" userId="60df6d5feed7ac60" providerId="LiveId" clId="{E396DAB5-DBA8-4C3B-B27B-31FB2DF75A1E}"/>
     <pc:docChg chg="undo custSel addSld modSld">
-      <pc:chgData name="Nick Rodriguez" userId="60df6d5feed7ac60" providerId="LiveId" clId="{E396DAB5-DBA8-4C3B-B27B-31FB2DF75A1E}" dt="2021-08-01T09:33:36.812" v="2949" actId="14100"/>
+      <pc:chgData name="Nick Rodriguez" userId="60df6d5feed7ac60" providerId="LiveId" clId="{E396DAB5-DBA8-4C3B-B27B-31FB2DF75A1E}" dt="2021-08-06T14:20:41.790" v="3364" actId="20577"/>
       <pc:docMkLst>
         <pc:docMk/>
       </pc:docMkLst>
@@ -284,8 +286,8 @@
           </ac:spMkLst>
         </pc:spChg>
       </pc:sldChg>
-      <pc:sldChg chg="modSp add mod setBg">
-        <pc:chgData name="Nick Rodriguez" userId="60df6d5feed7ac60" providerId="LiveId" clId="{E396DAB5-DBA8-4C3B-B27B-31FB2DF75A1E}" dt="2021-08-01T09:33:36.812" v="2949" actId="14100"/>
+      <pc:sldChg chg="addSp delSp modSp add mod setBg">
+        <pc:chgData name="Nick Rodriguez" userId="60df6d5feed7ac60" providerId="LiveId" clId="{E396DAB5-DBA8-4C3B-B27B-31FB2DF75A1E}" dt="2021-08-06T14:14:15.793" v="3202" actId="22"/>
         <pc:sldMkLst>
           <pc:docMk/>
           <pc:sldMk cId="182378689" sldId="262"/>
@@ -303,6 +305,84 @@
           <ac:spMkLst>
             <pc:docMk/>
             <pc:sldMk cId="182378689" sldId="262"/>
+            <ac:spMk id="3" creationId="{471E5327-8ED1-4525-8025-0617F94784D2}"/>
+          </ac:spMkLst>
+        </pc:spChg>
+        <pc:spChg chg="add del">
+          <ac:chgData name="Nick Rodriguez" userId="60df6d5feed7ac60" providerId="LiveId" clId="{E396DAB5-DBA8-4C3B-B27B-31FB2DF75A1E}" dt="2021-08-06T14:14:15.793" v="3202" actId="22"/>
+          <ac:spMkLst>
+            <pc:docMk/>
+            <pc:sldMk cId="182378689" sldId="262"/>
+            <ac:spMk id="7" creationId="{D2BA72E1-96B9-47DF-A564-05D42E508801}"/>
+          </ac:spMkLst>
+        </pc:spChg>
+      </pc:sldChg>
+      <pc:sldChg chg="addSp delSp modSp new mod">
+        <pc:chgData name="Nick Rodriguez" userId="60df6d5feed7ac60" providerId="LiveId" clId="{E396DAB5-DBA8-4C3B-B27B-31FB2DF75A1E}" dt="2021-08-02T14:56:18.235" v="3200" actId="20577"/>
+        <pc:sldMkLst>
+          <pc:docMk/>
+          <pc:sldMk cId="4080612181" sldId="263"/>
+        </pc:sldMkLst>
+        <pc:spChg chg="mod">
+          <ac:chgData name="Nick Rodriguez" userId="60df6d5feed7ac60" providerId="LiveId" clId="{E396DAB5-DBA8-4C3B-B27B-31FB2DF75A1E}" dt="2021-08-02T14:31:33.985" v="2973" actId="20577"/>
+          <ac:spMkLst>
+            <pc:docMk/>
+            <pc:sldMk cId="4080612181" sldId="263"/>
+            <ac:spMk id="2" creationId="{9732167D-70E6-492E-8CD4-228276C98778}"/>
+          </ac:spMkLst>
+        </pc:spChg>
+        <pc:spChg chg="mod">
+          <ac:chgData name="Nick Rodriguez" userId="60df6d5feed7ac60" providerId="LiveId" clId="{E396DAB5-DBA8-4C3B-B27B-31FB2DF75A1E}" dt="2021-08-02T14:55:02.890" v="3194" actId="14100"/>
+          <ac:spMkLst>
+            <pc:docMk/>
+            <pc:sldMk cId="4080612181" sldId="263"/>
+            <ac:spMk id="3" creationId="{AC3D23B7-A69F-4034-971F-9EFCD31B22C3}"/>
+          </ac:spMkLst>
+        </pc:spChg>
+        <pc:spChg chg="add del mod">
+          <ac:chgData name="Nick Rodriguez" userId="60df6d5feed7ac60" providerId="LiveId" clId="{E396DAB5-DBA8-4C3B-B27B-31FB2DF75A1E}" dt="2021-08-02T14:51:03.267" v="3138" actId="478"/>
+          <ac:spMkLst>
+            <pc:docMk/>
+            <pc:sldMk cId="4080612181" sldId="263"/>
+            <ac:spMk id="4" creationId="{A4A76DCD-06A5-486C-B5AD-77E08E9EBAAB}"/>
+          </ac:spMkLst>
+        </pc:spChg>
+        <pc:spChg chg="add mod">
+          <ac:chgData name="Nick Rodriguez" userId="60df6d5feed7ac60" providerId="LiveId" clId="{E396DAB5-DBA8-4C3B-B27B-31FB2DF75A1E}" dt="2021-08-02T14:55:58.544" v="3196" actId="1076"/>
+          <ac:spMkLst>
+            <pc:docMk/>
+            <pc:sldMk cId="4080612181" sldId="263"/>
+            <ac:spMk id="5" creationId="{B29E550D-906A-4336-BA71-9E8F021BF747}"/>
+          </ac:spMkLst>
+        </pc:spChg>
+        <pc:spChg chg="add mod">
+          <ac:chgData name="Nick Rodriguez" userId="60df6d5feed7ac60" providerId="LiveId" clId="{E396DAB5-DBA8-4C3B-B27B-31FB2DF75A1E}" dt="2021-08-02T14:56:18.235" v="3200" actId="20577"/>
+          <ac:spMkLst>
+            <pc:docMk/>
+            <pc:sldMk cId="4080612181" sldId="263"/>
+            <ac:spMk id="6" creationId="{1757093B-8DCF-43B2-9BC3-3028B6254A99}"/>
+          </ac:spMkLst>
+        </pc:spChg>
+      </pc:sldChg>
+      <pc:sldChg chg="modSp add mod">
+        <pc:chgData name="Nick Rodriguez" userId="60df6d5feed7ac60" providerId="LiveId" clId="{E396DAB5-DBA8-4C3B-B27B-31FB2DF75A1E}" dt="2021-08-06T14:20:41.790" v="3364" actId="20577"/>
+        <pc:sldMkLst>
+          <pc:docMk/>
+          <pc:sldMk cId="1489088610" sldId="264"/>
+        </pc:sldMkLst>
+        <pc:spChg chg="mod">
+          <ac:chgData name="Nick Rodriguez" userId="60df6d5feed7ac60" providerId="LiveId" clId="{E396DAB5-DBA8-4C3B-B27B-31FB2DF75A1E}" dt="2021-08-06T14:14:28.071" v="3206" actId="20577"/>
+          <ac:spMkLst>
+            <pc:docMk/>
+            <pc:sldMk cId="1489088610" sldId="264"/>
+            <ac:spMk id="2" creationId="{E2F8D61A-151A-41D4-ACD1-C7ACE57DA0FE}"/>
+          </ac:spMkLst>
+        </pc:spChg>
+        <pc:spChg chg="mod">
+          <ac:chgData name="Nick Rodriguez" userId="60df6d5feed7ac60" providerId="LiveId" clId="{E396DAB5-DBA8-4C3B-B27B-31FB2DF75A1E}" dt="2021-08-06T14:20:41.790" v="3364" actId="20577"/>
+          <ac:spMkLst>
+            <pc:docMk/>
+            <pc:sldMk cId="1489088610" sldId="264"/>
             <ac:spMk id="3" creationId="{471E5327-8ED1-4525-8025-0617F94784D2}"/>
           </ac:spMkLst>
         </pc:spChg>
@@ -459,7 +539,7 @@
           <a:p>
             <a:fld id="{D57D165D-784C-428F-B501-6E9E9CABBFA2}" type="datetimeFigureOut">
               <a:rPr lang="en-US" smtClean="0"/>
-              <a:t>8/1/2021</a:t>
+              <a:t>8/2/2021</a:t>
             </a:fld>
             <a:endParaRPr lang="en-US"/>
           </a:p>
@@ -657,7 +737,7 @@
           <a:p>
             <a:fld id="{D57D165D-784C-428F-B501-6E9E9CABBFA2}" type="datetimeFigureOut">
               <a:rPr lang="en-US" smtClean="0"/>
-              <a:t>8/1/2021</a:t>
+              <a:t>8/2/2021</a:t>
             </a:fld>
             <a:endParaRPr lang="en-US"/>
           </a:p>
@@ -865,7 +945,7 @@
           <a:p>
             <a:fld id="{D57D165D-784C-428F-B501-6E9E9CABBFA2}" type="datetimeFigureOut">
               <a:rPr lang="en-US" smtClean="0"/>
-              <a:t>8/1/2021</a:t>
+              <a:t>8/2/2021</a:t>
             </a:fld>
             <a:endParaRPr lang="en-US"/>
           </a:p>
@@ -1063,7 +1143,7 @@
           <a:p>
             <a:fld id="{D57D165D-784C-428F-B501-6E9E9CABBFA2}" type="datetimeFigureOut">
               <a:rPr lang="en-US" smtClean="0"/>
-              <a:t>8/1/2021</a:t>
+              <a:t>8/2/2021</a:t>
             </a:fld>
             <a:endParaRPr lang="en-US"/>
           </a:p>
@@ -1338,7 +1418,7 @@
           <a:p>
             <a:fld id="{D57D165D-784C-428F-B501-6E9E9CABBFA2}" type="datetimeFigureOut">
               <a:rPr lang="en-US" smtClean="0"/>
-              <a:t>8/1/2021</a:t>
+              <a:t>8/2/2021</a:t>
             </a:fld>
             <a:endParaRPr lang="en-US"/>
           </a:p>
@@ -1603,7 +1683,7 @@
           <a:p>
             <a:fld id="{D57D165D-784C-428F-B501-6E9E9CABBFA2}" type="datetimeFigureOut">
               <a:rPr lang="en-US" smtClean="0"/>
-              <a:t>8/1/2021</a:t>
+              <a:t>8/2/2021</a:t>
             </a:fld>
             <a:endParaRPr lang="en-US"/>
           </a:p>
@@ -2015,7 +2095,7 @@
           <a:p>
             <a:fld id="{D57D165D-784C-428F-B501-6E9E9CABBFA2}" type="datetimeFigureOut">
               <a:rPr lang="en-US" smtClean="0"/>
-              <a:t>8/1/2021</a:t>
+              <a:t>8/2/2021</a:t>
             </a:fld>
             <a:endParaRPr lang="en-US"/>
           </a:p>
@@ -2156,7 +2236,7 @@
           <a:p>
             <a:fld id="{D57D165D-784C-428F-B501-6E9E9CABBFA2}" type="datetimeFigureOut">
               <a:rPr lang="en-US" smtClean="0"/>
-              <a:t>8/1/2021</a:t>
+              <a:t>8/2/2021</a:t>
             </a:fld>
             <a:endParaRPr lang="en-US"/>
           </a:p>
@@ -2269,7 +2349,7 @@
           <a:p>
             <a:fld id="{D57D165D-784C-428F-B501-6E9E9CABBFA2}" type="datetimeFigureOut">
               <a:rPr lang="en-US" smtClean="0"/>
-              <a:t>8/1/2021</a:t>
+              <a:t>8/2/2021</a:t>
             </a:fld>
             <a:endParaRPr lang="en-US"/>
           </a:p>
@@ -2580,7 +2660,7 @@
           <a:p>
             <a:fld id="{D57D165D-784C-428F-B501-6E9E9CABBFA2}" type="datetimeFigureOut">
               <a:rPr lang="en-US" smtClean="0"/>
-              <a:t>8/1/2021</a:t>
+              <a:t>8/2/2021</a:t>
             </a:fld>
             <a:endParaRPr lang="en-US"/>
           </a:p>
@@ -2868,7 +2948,7 @@
           <a:p>
             <a:fld id="{D57D165D-784C-428F-B501-6E9E9CABBFA2}" type="datetimeFigureOut">
               <a:rPr lang="en-US" smtClean="0"/>
-              <a:t>8/1/2021</a:t>
+              <a:t>8/2/2021</a:t>
             </a:fld>
             <a:endParaRPr lang="en-US"/>
           </a:p>
@@ -3109,7 +3189,7 @@
           <a:p>
             <a:fld id="{D57D165D-784C-428F-B501-6E9E9CABBFA2}" type="datetimeFigureOut">
               <a:rPr lang="en-US" smtClean="0"/>
-              <a:t>8/1/2021</a:t>
+              <a:t>8/2/2021</a:t>
             </a:fld>
             <a:endParaRPr lang="en-US"/>
           </a:p>
@@ -6303,6 +6383,1682 @@
 </p:sld>
 </file>
 
+<file path=ppt/slides/slide8.xml><?xml version="1.0" encoding="utf-8"?>
+<p:sld xmlns:a="http://schemas.openxmlformats.org/drawingml/2006/main" xmlns:r="http://schemas.openxmlformats.org/officeDocument/2006/relationships" xmlns:p="http://schemas.openxmlformats.org/presentationml/2006/main">
+  <p:cSld>
+    <p:spTree>
+      <p:nvGrpSpPr>
+        <p:cNvPr id="1" name=""/>
+        <p:cNvGrpSpPr/>
+        <p:nvPr/>
+      </p:nvGrpSpPr>
+      <p:grpSpPr>
+        <a:xfrm>
+          <a:off x="0" y="0"/>
+          <a:ext cx="0" cy="0"/>
+          <a:chOff x="0" y="0"/>
+          <a:chExt cx="0" cy="0"/>
+        </a:xfrm>
+      </p:grpSpPr>
+      <p:sp>
+        <p:nvSpPr>
+          <p:cNvPr id="2" name="Title 1">
+            <a:extLst>
+              <a:ext uri="{FF2B5EF4-FFF2-40B4-BE49-F238E27FC236}">
+                <a16:creationId xmlns:a16="http://schemas.microsoft.com/office/drawing/2014/main" id="{E2F8D61A-151A-41D4-ACD1-C7ACE57DA0FE}"/>
+              </a:ext>
+            </a:extLst>
+          </p:cNvPr>
+          <p:cNvSpPr>
+            <a:spLocks noGrp="1"/>
+          </p:cNvSpPr>
+          <p:nvPr>
+            <p:ph type="title"/>
+          </p:nvPr>
+        </p:nvSpPr>
+        <p:spPr/>
+        <p:txBody>
+          <a:bodyPr/>
+          <a:lstStyle/>
+          <a:p>
+            <a:r>
+              <a:rPr lang="en-US" dirty="0"/>
+              <a:t>Database v3 </a:t>
+            </a:r>
+            <a:r>
+              <a:rPr lang="en-US" sz="2400" dirty="0"/>
+              <a:t>(8/6/2021)</a:t>
+            </a:r>
+            <a:endParaRPr lang="en-US" dirty="0"/>
+          </a:p>
+        </p:txBody>
+      </p:sp>
+      <p:sp>
+        <p:nvSpPr>
+          <p:cNvPr id="3" name="Content Placeholder 2">
+            <a:extLst>
+              <a:ext uri="{FF2B5EF4-FFF2-40B4-BE49-F238E27FC236}">
+                <a16:creationId xmlns:a16="http://schemas.microsoft.com/office/drawing/2014/main" id="{471E5327-8ED1-4525-8025-0617F94784D2}"/>
+              </a:ext>
+            </a:extLst>
+          </p:cNvPr>
+          <p:cNvSpPr>
+            <a:spLocks noGrp="1"/>
+          </p:cNvSpPr>
+          <p:nvPr>
+            <p:ph idx="1"/>
+          </p:nvPr>
+        </p:nvSpPr>
+        <p:spPr>
+          <a:xfrm>
+            <a:off x="838200" y="1359281"/>
+            <a:ext cx="10515600" cy="3933265"/>
+          </a:xfrm>
+        </p:spPr>
+        <p:txBody>
+          <a:bodyPr numCol="2">
+            <a:normAutofit/>
+          </a:bodyPr>
+          <a:lstStyle/>
+          <a:p>
+            <a:r>
+              <a:rPr lang="en-US" sz="1000" dirty="0"/>
+              <a:t>User table</a:t>
+            </a:r>
+          </a:p>
+          <a:p>
+            <a:pPr lvl="1"/>
+            <a:r>
+              <a:rPr lang="en-US" sz="900" dirty="0"/>
+              <a:t>Username</a:t>
+            </a:r>
+          </a:p>
+          <a:p>
+            <a:pPr lvl="1"/>
+            <a:r>
+              <a:rPr lang="en-US" sz="900" dirty="0"/>
+              <a:t>Email</a:t>
+            </a:r>
+          </a:p>
+          <a:p>
+            <a:pPr lvl="1"/>
+            <a:r>
+              <a:rPr lang="en-US" sz="900" dirty="0"/>
+              <a:t>Password</a:t>
+            </a:r>
+          </a:p>
+          <a:p>
+            <a:pPr lvl="1"/>
+            <a:r>
+              <a:rPr lang="en-US" sz="900" dirty="0"/>
+              <a:t>Permission (view nick’s data?)</a:t>
+            </a:r>
+          </a:p>
+          <a:p>
+            <a:pPr lvl="1"/>
+            <a:r>
+              <a:rPr lang="en-US" sz="900" dirty="0"/>
+              <a:t>Profile image</a:t>
+            </a:r>
+          </a:p>
+          <a:p>
+            <a:pPr lvl="1"/>
+            <a:r>
+              <a:rPr lang="en-US" sz="900" dirty="0"/>
+              <a:t>Time stamp registered</a:t>
+            </a:r>
+          </a:p>
+          <a:p>
+            <a:pPr lvl="1"/>
+            <a:r>
+              <a:rPr lang="en-US" sz="900" dirty="0"/>
+              <a:t>User </a:t>
+            </a:r>
+            <a:r>
+              <a:rPr lang="en-US" sz="900" dirty="0" err="1"/>
+              <a:t>timezone</a:t>
+            </a:r>
+            <a:endParaRPr lang="en-US" sz="900" dirty="0"/>
+          </a:p>
+          <a:p>
+            <a:r>
+              <a:rPr lang="en-US" sz="1000" dirty="0"/>
+              <a:t>Posts Table</a:t>
+            </a:r>
+          </a:p>
+          <a:p>
+            <a:r>
+              <a:rPr lang="en-US" sz="1000" dirty="0" err="1"/>
+              <a:t>Health_meta</a:t>
+            </a:r>
+            <a:endParaRPr lang="en-US" sz="1000" dirty="0"/>
+          </a:p>
+          <a:p>
+            <a:pPr lvl="1"/>
+            <a:r>
+              <a:rPr lang="en-US" sz="900" dirty="0"/>
+              <a:t>Id</a:t>
+            </a:r>
+          </a:p>
+          <a:p>
+            <a:pPr lvl="1"/>
+            <a:r>
+              <a:rPr lang="en-US" sz="900" dirty="0" err="1"/>
+              <a:t>User_id</a:t>
+            </a:r>
+            <a:r>
+              <a:rPr lang="en-US" sz="900" dirty="0"/>
+              <a:t>(foreign key)</a:t>
+            </a:r>
+          </a:p>
+          <a:p>
+            <a:pPr lvl="1"/>
+            <a:r>
+              <a:rPr lang="en-US" sz="900" dirty="0"/>
+              <a:t>Var activity (walking, running, empty is okay for something like mood)</a:t>
+            </a:r>
+          </a:p>
+          <a:p>
+            <a:pPr lvl="1"/>
+            <a:r>
+              <a:rPr lang="en-US" sz="900" dirty="0" err="1"/>
+              <a:t>var_type</a:t>
+            </a:r>
+            <a:r>
+              <a:rPr lang="en-US" sz="900" dirty="0"/>
+              <a:t> (mood, weight, heart rate (instance), etc.,) – LB standardized</a:t>
+            </a:r>
+          </a:p>
+          <a:p>
+            <a:pPr lvl="1"/>
+            <a:r>
+              <a:rPr lang="en-US" sz="900" dirty="0" err="1"/>
+              <a:t>Var_periodicity</a:t>
+            </a:r>
+            <a:r>
+              <a:rPr lang="en-US" sz="900" dirty="0"/>
+              <a:t> – days, seconds (</a:t>
+            </a:r>
+            <a:r>
+              <a:rPr lang="en-US" sz="900" dirty="0" err="1"/>
+              <a:t>i.e</a:t>
+            </a:r>
+            <a:r>
+              <a:rPr lang="en-US" sz="900" dirty="0"/>
+              <a:t> what are the measurements in – maybe redundant to </a:t>
+            </a:r>
+            <a:r>
+              <a:rPr lang="en-US" sz="900" dirty="0" err="1"/>
+              <a:t>var_unit</a:t>
+            </a:r>
+            <a:r>
+              <a:rPr lang="en-US" sz="900" dirty="0"/>
+              <a:t>?)</a:t>
+            </a:r>
+          </a:p>
+          <a:p>
+            <a:pPr lvl="1"/>
+            <a:r>
+              <a:rPr lang="en-US" sz="900" dirty="0" err="1"/>
+              <a:t>var_unit</a:t>
+            </a:r>
+            <a:r>
+              <a:rPr lang="en-US" sz="900" dirty="0"/>
+              <a:t>– LB will standardize across data sets</a:t>
+            </a:r>
+          </a:p>
+          <a:p>
+            <a:pPr lvl="1"/>
+            <a:r>
+              <a:rPr lang="en-US" sz="900" dirty="0" err="1"/>
+              <a:t>var_timezone_utc_delta_in_mins</a:t>
+            </a:r>
+            <a:r>
+              <a:rPr lang="en-US" sz="900" dirty="0"/>
+              <a:t> = </a:t>
+            </a:r>
+            <a:r>
+              <a:rPr lang="en-US" sz="900" dirty="0" err="1"/>
+              <a:t>db.Column</a:t>
+            </a:r>
+            <a:r>
+              <a:rPr lang="en-US" sz="900" dirty="0"/>
+              <a:t>(</a:t>
+            </a:r>
+            <a:r>
+              <a:rPr lang="en-US" sz="900" dirty="0" err="1"/>
+              <a:t>db.Float</a:t>
+            </a:r>
+            <a:r>
+              <a:rPr lang="en-US" sz="900" dirty="0"/>
+              <a:t>) #difference </a:t>
+            </a:r>
+            <a:r>
+              <a:rPr lang="en-US" sz="900" dirty="0" err="1"/>
+              <a:t>bewteen</a:t>
+            </a:r>
+            <a:r>
+              <a:rPr lang="en-US" sz="900" dirty="0"/>
+              <a:t> </a:t>
+            </a:r>
+            <a:r>
+              <a:rPr lang="en-US" sz="900" dirty="0" err="1"/>
+              <a:t>utc</a:t>
+            </a:r>
+            <a:r>
+              <a:rPr lang="en-US" sz="900" dirty="0"/>
+              <a:t> and </a:t>
+            </a:r>
+            <a:r>
+              <a:rPr lang="en-US" sz="900" dirty="0" err="1"/>
+              <a:t>timezone</a:t>
+            </a:r>
+            <a:r>
+              <a:rPr lang="en-US" sz="900" dirty="0"/>
+              <a:t> of exercise</a:t>
+            </a:r>
+          </a:p>
+          <a:p>
+            <a:pPr lvl="1"/>
+            <a:r>
+              <a:rPr lang="en-US" sz="900" dirty="0" err="1"/>
+              <a:t>time_stamp_utc</a:t>
+            </a:r>
+            <a:r>
+              <a:rPr lang="en-US" sz="900" dirty="0"/>
+              <a:t> – time stamp of entry </a:t>
+            </a:r>
+          </a:p>
+          <a:p>
+            <a:pPr lvl="1"/>
+            <a:endParaRPr lang="en-US" sz="900" dirty="0"/>
+          </a:p>
+          <a:p>
+            <a:endParaRPr lang="en-US" sz="1000" dirty="0"/>
+          </a:p>
+          <a:p>
+            <a:r>
+              <a:rPr lang="en-US" sz="1000"/>
+              <a:t>Health_measure</a:t>
+            </a:r>
+            <a:endParaRPr lang="en-US" sz="1000" dirty="0"/>
+          </a:p>
+          <a:p>
+            <a:pPr lvl="1"/>
+            <a:r>
+              <a:rPr lang="en-US" sz="900" dirty="0"/>
+              <a:t>Id</a:t>
+            </a:r>
+          </a:p>
+          <a:p>
+            <a:pPr lvl="1"/>
+            <a:r>
+              <a:rPr lang="en-US" sz="900" dirty="0" err="1"/>
+              <a:t>Activity_Table_id</a:t>
+            </a:r>
+            <a:r>
+              <a:rPr lang="en-US" sz="900" dirty="0"/>
+              <a:t> (foreign key)</a:t>
+            </a:r>
+          </a:p>
+          <a:p>
+            <a:pPr lvl="1"/>
+            <a:r>
+              <a:rPr lang="en-US" sz="900" dirty="0" err="1"/>
+              <a:t>var_datetime_utc</a:t>
+            </a:r>
+            <a:r>
+              <a:rPr lang="en-US" sz="900" dirty="0"/>
+              <a:t>  (Date, hour, min, sec converted to </a:t>
+            </a:r>
+            <a:r>
+              <a:rPr lang="en-US" sz="900" dirty="0" err="1"/>
+              <a:t>utc</a:t>
+            </a:r>
+            <a:r>
+              <a:rPr lang="en-US" sz="900" dirty="0"/>
+              <a:t>)</a:t>
+            </a:r>
+          </a:p>
+          <a:p>
+            <a:pPr lvl="1"/>
+            <a:r>
+              <a:rPr lang="en-US" sz="900" dirty="0" err="1"/>
+              <a:t>Var_value</a:t>
+            </a:r>
+            <a:r>
+              <a:rPr lang="en-US" sz="900" dirty="0"/>
+              <a:t> [measurement]</a:t>
+            </a:r>
+          </a:p>
+          <a:p>
+            <a:pPr lvl="1"/>
+            <a:endParaRPr lang="en-US" sz="900" dirty="0"/>
+          </a:p>
+        </p:txBody>
+      </p:sp>
+      <p:sp>
+        <p:nvSpPr>
+          <p:cNvPr id="4" name="TextBox 3">
+            <a:extLst>
+              <a:ext uri="{FF2B5EF4-FFF2-40B4-BE49-F238E27FC236}">
+                <a16:creationId xmlns:a16="http://schemas.microsoft.com/office/drawing/2014/main" id="{16AC410D-4FDE-4ECD-8104-91DD87EC4AB5}"/>
+              </a:ext>
+            </a:extLst>
+          </p:cNvPr>
+          <p:cNvSpPr txBox="1"/>
+          <p:nvPr/>
+        </p:nvSpPr>
+        <p:spPr>
+          <a:xfrm>
+            <a:off x="335280" y="5292546"/>
+            <a:ext cx="5590032" cy="1200329"/>
+          </a:xfrm>
+          <a:prstGeom prst="rect">
+            <a:avLst/>
+          </a:prstGeom>
+          <a:noFill/>
+        </p:spPr>
+        <p:txBody>
+          <a:bodyPr wrap="square" rtlCol="0">
+            <a:spAutoFit/>
+          </a:bodyPr>
+          <a:lstStyle/>
+          <a:p>
+            <a:r>
+              <a:rPr lang="en-US" dirty="0"/>
+              <a:t>Data upload processing steps:</a:t>
+            </a:r>
+          </a:p>
+          <a:p>
+            <a:pPr marL="342900" indent="-342900">
+              <a:buFont typeface="+mj-lt"/>
+              <a:buAutoNum type="arabicPeriod"/>
+            </a:pPr>
+            <a:r>
+              <a:rPr lang="en-US" dirty="0"/>
+              <a:t>Data gets uploaded through web or phone app. </a:t>
+            </a:r>
+          </a:p>
+          <a:p>
+            <a:pPr marL="342900" indent="-342900">
+              <a:buFont typeface="+mj-lt"/>
+              <a:buAutoNum type="arabicPeriod"/>
+            </a:pPr>
+            <a:r>
+              <a:rPr lang="en-US" dirty="0"/>
+              <a:t>Backend converts the input data to fit in Variable table via pandas </a:t>
+            </a:r>
+            <a:r>
+              <a:rPr lang="en-US" dirty="0" err="1"/>
+              <a:t>dataframe</a:t>
+            </a:r>
+            <a:r>
+              <a:rPr lang="en-US" dirty="0"/>
+              <a:t>. </a:t>
+            </a:r>
+          </a:p>
+        </p:txBody>
+      </p:sp>
+      <p:sp>
+        <p:nvSpPr>
+          <p:cNvPr id="5" name="TextBox 4">
+            <a:extLst>
+              <a:ext uri="{FF2B5EF4-FFF2-40B4-BE49-F238E27FC236}">
+                <a16:creationId xmlns:a16="http://schemas.microsoft.com/office/drawing/2014/main" id="{E2302978-4299-4BE6-87E5-0A396DEBDAD0}"/>
+              </a:ext>
+            </a:extLst>
+          </p:cNvPr>
+          <p:cNvSpPr txBox="1"/>
+          <p:nvPr/>
+        </p:nvSpPr>
+        <p:spPr>
+          <a:xfrm>
+            <a:off x="6275832" y="5310834"/>
+            <a:ext cx="5580888" cy="1200329"/>
+          </a:xfrm>
+          <a:prstGeom prst="rect">
+            <a:avLst/>
+          </a:prstGeom>
+          <a:noFill/>
+        </p:spPr>
+        <p:txBody>
+          <a:bodyPr wrap="square" rtlCol="0">
+            <a:spAutoFit/>
+          </a:bodyPr>
+          <a:lstStyle/>
+          <a:p>
+            <a:r>
+              <a:rPr lang="en-US" dirty="0"/>
+              <a:t>Data report processing steps:</a:t>
+            </a:r>
+          </a:p>
+          <a:p>
+            <a:pPr marL="342900" indent="-342900">
+              <a:buFont typeface="+mj-lt"/>
+              <a:buAutoNum type="arabicPeriod"/>
+            </a:pPr>
+            <a:r>
+              <a:rPr lang="en-US" dirty="0"/>
+              <a:t>Collect data from database into </a:t>
+            </a:r>
+            <a:r>
+              <a:rPr lang="en-US" dirty="0" err="1"/>
+              <a:t>dataframe</a:t>
+            </a:r>
+            <a:r>
+              <a:rPr lang="en-US" dirty="0"/>
+              <a:t>.</a:t>
+            </a:r>
+          </a:p>
+          <a:p>
+            <a:pPr marL="342900" indent="-342900">
+              <a:buFont typeface="+mj-lt"/>
+              <a:buAutoNum type="arabicPeriod"/>
+            </a:pPr>
+            <a:r>
+              <a:rPr lang="en-US" dirty="0"/>
+              <a:t>Convert </a:t>
+            </a:r>
+            <a:r>
+              <a:rPr lang="en-US" dirty="0" err="1"/>
+              <a:t>dataframe</a:t>
+            </a:r>
+            <a:r>
+              <a:rPr lang="en-US" dirty="0"/>
+              <a:t> to format for chart, table or </a:t>
+            </a:r>
+            <a:r>
+              <a:rPr lang="en-US" dirty="0" err="1"/>
+              <a:t>excelt</a:t>
+            </a:r>
+            <a:r>
+              <a:rPr lang="en-US" dirty="0"/>
+              <a:t> </a:t>
+            </a:r>
+            <a:r>
+              <a:rPr lang="en-US"/>
+              <a:t>report.</a:t>
+            </a:r>
+            <a:endParaRPr lang="en-US" dirty="0"/>
+          </a:p>
+        </p:txBody>
+      </p:sp>
+    </p:spTree>
+    <p:extLst>
+      <p:ext uri="{BB962C8B-B14F-4D97-AF65-F5344CB8AC3E}">
+        <p14:creationId xmlns:p14="http://schemas.microsoft.com/office/powerpoint/2010/main" val="1489088610"/>
+      </p:ext>
+    </p:extLst>
+  </p:cSld>
+  <p:clrMapOvr>
+    <a:masterClrMapping/>
+  </p:clrMapOvr>
+</p:sld>
+</file>
+
+<file path=ppt/slides/slide9.xml><?xml version="1.0" encoding="utf-8"?>
+<p:sld xmlns:a="http://schemas.openxmlformats.org/drawingml/2006/main" xmlns:r="http://schemas.openxmlformats.org/officeDocument/2006/relationships" xmlns:p="http://schemas.openxmlformats.org/presentationml/2006/main">
+  <p:cSld>
+    <p:spTree>
+      <p:nvGrpSpPr>
+        <p:cNvPr id="1" name=""/>
+        <p:cNvGrpSpPr/>
+        <p:nvPr/>
+      </p:nvGrpSpPr>
+      <p:grpSpPr>
+        <a:xfrm>
+          <a:off x="0" y="0"/>
+          <a:ext cx="0" cy="0"/>
+          <a:chOff x="0" y="0"/>
+          <a:chExt cx="0" cy="0"/>
+        </a:xfrm>
+      </p:grpSpPr>
+      <p:sp>
+        <p:nvSpPr>
+          <p:cNvPr id="2" name="Title 1">
+            <a:extLst>
+              <a:ext uri="{FF2B5EF4-FFF2-40B4-BE49-F238E27FC236}">
+                <a16:creationId xmlns:a16="http://schemas.microsoft.com/office/drawing/2014/main" id="{9732167D-70E6-492E-8CD4-228276C98778}"/>
+              </a:ext>
+            </a:extLst>
+          </p:cNvPr>
+          <p:cNvSpPr>
+            <a:spLocks noGrp="1"/>
+          </p:cNvSpPr>
+          <p:nvPr>
+            <p:ph type="title"/>
+          </p:nvPr>
+        </p:nvSpPr>
+        <p:spPr/>
+        <p:txBody>
+          <a:bodyPr/>
+          <a:lstStyle/>
+          <a:p>
+            <a:r>
+              <a:rPr lang="en-US" dirty="0"/>
+              <a:t>Heart Rate Model</a:t>
+            </a:r>
+          </a:p>
+        </p:txBody>
+      </p:sp>
+      <mc:AlternateContent xmlns:mc="http://schemas.openxmlformats.org/markup-compatibility/2006">
+        <mc:Choice xmlns:a14="http://schemas.microsoft.com/office/drawing/2010/main" Requires="a14">
+          <p:sp>
+            <p:nvSpPr>
+              <p:cNvPr id="3" name="Content Placeholder 2">
+                <a:extLst>
+                  <a:ext uri="{FF2B5EF4-FFF2-40B4-BE49-F238E27FC236}">
+                    <a16:creationId xmlns:a16="http://schemas.microsoft.com/office/drawing/2014/main" id="{AC3D23B7-A69F-4034-971F-9EFCD31B22C3}"/>
+                  </a:ext>
+                </a:extLst>
+              </p:cNvPr>
+              <p:cNvSpPr>
+                <a:spLocks noGrp="1"/>
+              </p:cNvSpPr>
+              <p:nvPr>
+                <p:ph idx="1"/>
+              </p:nvPr>
+            </p:nvSpPr>
+            <p:spPr>
+              <a:xfrm>
+                <a:off x="838200" y="1825625"/>
+                <a:ext cx="4089400" cy="984687"/>
+              </a:xfrm>
+            </p:spPr>
+            <p:txBody>
+              <a:bodyPr>
+                <a:normAutofit fontScale="77500" lnSpcReduction="20000"/>
+              </a:bodyPr>
+              <a:lstStyle/>
+              <a:p>
+                <a:pPr marL="0" indent="0">
+                  <a:buNone/>
+                </a:pPr>
+                <a14:m>
+                  <m:oMathPara xmlns:m="http://schemas.openxmlformats.org/officeDocument/2006/math">
+                    <m:oMathParaPr>
+                      <m:jc m:val="centerGroup"/>
+                    </m:oMathParaPr>
+                    <m:oMath xmlns:m="http://schemas.openxmlformats.org/officeDocument/2006/math">
+                      <m:r>
+                        <a:rPr lang="en-US" b="0" i="1" smtClean="0">
+                          <a:latin typeface="Cambria Math" panose="02040503050406030204" pitchFamily="18" charset="0"/>
+                        </a:rPr>
+                        <m:t>𝑓</m:t>
+                      </m:r>
+                      <m:r>
+                        <a:rPr lang="en-US" i="1" smtClean="0">
+                          <a:latin typeface="Cambria Math" panose="02040503050406030204" pitchFamily="18" charset="0"/>
+                        </a:rPr>
+                        <m:t>(</m:t>
+                      </m:r>
+                      <m:r>
+                        <m:rPr>
+                          <m:sty m:val="p"/>
+                        </m:rPr>
+                        <a:rPr lang="el-GR" i="1" smtClean="0">
+                          <a:latin typeface="Cambria Math" panose="02040503050406030204" pitchFamily="18" charset="0"/>
+                        </a:rPr>
+                        <m:t>λ</m:t>
+                      </m:r>
+                      <m:r>
+                        <a:rPr lang="en-US" b="0" i="1" smtClean="0">
+                          <a:latin typeface="Cambria Math" panose="02040503050406030204" pitchFamily="18" charset="0"/>
+                        </a:rPr>
+                        <m:t>)</m:t>
+                      </m:r>
+                      <m:r>
+                        <a:rPr lang="pt-BR" i="1" smtClean="0">
+                          <a:latin typeface="Cambria Math" panose="02040503050406030204" pitchFamily="18" charset="0"/>
+                        </a:rPr>
+                        <m:t>=</m:t>
+                      </m:r>
+                      <m:nary>
+                        <m:naryPr>
+                          <m:chr m:val="∑"/>
+                          <m:ctrlPr>
+                            <a:rPr lang="pt-BR" i="1" smtClean="0">
+                              <a:latin typeface="Cambria Math" panose="02040503050406030204" pitchFamily="18" charset="0"/>
+                            </a:rPr>
+                          </m:ctrlPr>
+                        </m:naryPr>
+                        <m:sub>
+                          <m:r>
+                            <a:rPr lang="en-US" b="0" i="1" smtClean="0">
+                              <a:latin typeface="Cambria Math" panose="02040503050406030204" pitchFamily="18" charset="0"/>
+                            </a:rPr>
+                            <m:t>𝑖</m:t>
+                          </m:r>
+                          <m:r>
+                            <a:rPr lang="pt-BR" i="1" smtClean="0">
+                              <a:latin typeface="Cambria Math" panose="02040503050406030204" pitchFamily="18" charset="0"/>
+                            </a:rPr>
+                            <m:t>=</m:t>
+                          </m:r>
+                          <m:r>
+                            <a:rPr lang="en-US" b="0" i="1" smtClean="0">
+                              <a:latin typeface="Cambria Math" panose="02040503050406030204" pitchFamily="18" charset="0"/>
+                            </a:rPr>
+                            <m:t>1</m:t>
+                          </m:r>
+                        </m:sub>
+                        <m:sup>
+                          <m:r>
+                            <a:rPr lang="pt-BR" i="1" smtClean="0">
+                              <a:latin typeface="Cambria Math" panose="02040503050406030204" pitchFamily="18" charset="0"/>
+                            </a:rPr>
+                            <m:t>𝑛</m:t>
+                          </m:r>
+                        </m:sup>
+                        <m:e>
+                          <m:sSup>
+                            <m:sSupPr>
+                              <m:ctrlPr>
+                                <a:rPr lang="pt-BR" i="1" smtClean="0">
+                                  <a:latin typeface="Cambria Math" panose="02040503050406030204" pitchFamily="18" charset="0"/>
+                                </a:rPr>
+                              </m:ctrlPr>
+                            </m:sSupPr>
+                            <m:e>
+                              <m:d>
+                                <m:dPr>
+                                  <m:ctrlPr>
+                                    <a:rPr lang="pt-BR" i="1">
+                                      <a:latin typeface="Cambria Math" panose="02040503050406030204" pitchFamily="18" charset="0"/>
+                                    </a:rPr>
+                                  </m:ctrlPr>
+                                </m:dPr>
+                                <m:e>
+                                  <m:sSub>
+                                    <m:sSubPr>
+                                      <m:ctrlPr>
+                                        <a:rPr lang="en-US" i="1">
+                                          <a:latin typeface="Cambria Math" panose="02040503050406030204" pitchFamily="18" charset="0"/>
+                                        </a:rPr>
+                                      </m:ctrlPr>
+                                    </m:sSubPr>
+                                    <m:e>
+                                      <m:r>
+                                        <a:rPr lang="en-US" i="1">
+                                          <a:latin typeface="Cambria Math" panose="02040503050406030204" pitchFamily="18" charset="0"/>
+                                        </a:rPr>
+                                        <m:t>𝐻𝑅</m:t>
+                                      </m:r>
+                                    </m:e>
+                                    <m:sub>
+                                      <m:r>
+                                        <a:rPr lang="en-US" i="1">
+                                          <a:latin typeface="Cambria Math" panose="02040503050406030204" pitchFamily="18" charset="0"/>
+                                        </a:rPr>
+                                        <m:t>𝑖</m:t>
+                                      </m:r>
+                                    </m:sub>
+                                  </m:sSub>
+                                  <m:r>
+                                    <a:rPr lang="en-US" i="1">
+                                      <a:latin typeface="Cambria Math" panose="02040503050406030204" pitchFamily="18" charset="0"/>
+                                    </a:rPr>
+                                    <m:t>−</m:t>
+                                  </m:r>
+                                  <m:sSubSup>
+                                    <m:sSubSupPr>
+                                      <m:ctrlPr>
+                                        <a:rPr lang="en-US" i="1">
+                                          <a:latin typeface="Cambria Math" panose="02040503050406030204" pitchFamily="18" charset="0"/>
+                                        </a:rPr>
+                                      </m:ctrlPr>
+                                    </m:sSubSupPr>
+                                    <m:e>
+                                      <m:r>
+                                        <a:rPr lang="en-US" i="1">
+                                          <a:latin typeface="Cambria Math" panose="02040503050406030204" pitchFamily="18" charset="0"/>
+                                        </a:rPr>
+                                        <m:t>𝐻𝑅</m:t>
+                                      </m:r>
+                                    </m:e>
+                                    <m:sub>
+                                      <m:r>
+                                        <a:rPr lang="en-US" i="1">
+                                          <a:latin typeface="Cambria Math" panose="02040503050406030204" pitchFamily="18" charset="0"/>
+                                        </a:rPr>
+                                        <m:t>𝑖</m:t>
+                                      </m:r>
+                                    </m:sub>
+                                    <m:sup>
+                                      <m:r>
+                                        <a:rPr lang="en-US" i="1">
+                                          <a:latin typeface="Cambria Math" panose="02040503050406030204" pitchFamily="18" charset="0"/>
+                                        </a:rPr>
+                                        <m:t>𝑚</m:t>
+                                      </m:r>
+                                    </m:sup>
+                                  </m:sSubSup>
+                                </m:e>
+                              </m:d>
+                            </m:e>
+                            <m:sup>
+                              <m:r>
+                                <a:rPr lang="en-US" b="0" i="1" smtClean="0">
+                                  <a:latin typeface="Cambria Math" panose="02040503050406030204" pitchFamily="18" charset="0"/>
+                                </a:rPr>
+                                <m:t>2</m:t>
+                              </m:r>
+                            </m:sup>
+                          </m:sSup>
+                        </m:e>
+                      </m:nary>
+                    </m:oMath>
+                  </m:oMathPara>
+                </a14:m>
+                <a:endParaRPr lang="en-US" dirty="0"/>
+              </a:p>
+            </p:txBody>
+          </p:sp>
+        </mc:Choice>
+        <mc:Fallback>
+          <p:sp>
+            <p:nvSpPr>
+              <p:cNvPr id="3" name="Content Placeholder 2">
+                <a:extLst>
+                  <a:ext uri="{FF2B5EF4-FFF2-40B4-BE49-F238E27FC236}">
+                    <a16:creationId xmlns:a16="http://schemas.microsoft.com/office/drawing/2014/main" id="{AC3D23B7-A69F-4034-971F-9EFCD31B22C3}"/>
+                  </a:ext>
+                </a:extLst>
+              </p:cNvPr>
+              <p:cNvSpPr>
+                <a:spLocks noGrp="1" noRot="1" noChangeAspect="1" noMove="1" noResize="1" noEditPoints="1" noAdjustHandles="1" noChangeArrowheads="1" noChangeShapeType="1" noTextEdit="1"/>
+              </p:cNvSpPr>
+              <p:nvPr>
+                <p:ph idx="1"/>
+              </p:nvPr>
+            </p:nvSpPr>
+            <p:spPr>
+              <a:xfrm>
+                <a:off x="838200" y="1825625"/>
+                <a:ext cx="4089400" cy="984687"/>
+              </a:xfrm>
+              <a:blipFill>
+                <a:blip r:embed="rId2"/>
+                <a:stretch>
+                  <a:fillRect/>
+                </a:stretch>
+              </a:blipFill>
+            </p:spPr>
+            <p:txBody>
+              <a:bodyPr/>
+              <a:lstStyle/>
+              <a:p>
+                <a:r>
+                  <a:rPr lang="en-US">
+                    <a:noFill/>
+                  </a:rPr>
+                  <a:t> </a:t>
+                </a:r>
+              </a:p>
+            </p:txBody>
+          </p:sp>
+        </mc:Fallback>
+      </mc:AlternateContent>
+      <mc:AlternateContent xmlns:mc="http://schemas.openxmlformats.org/markup-compatibility/2006">
+        <mc:Choice xmlns:a14="http://schemas.microsoft.com/office/drawing/2010/main" Requires="a14">
+          <p:sp>
+            <p:nvSpPr>
+              <p:cNvPr id="5" name="Content Placeholder 2">
+                <a:extLst>
+                  <a:ext uri="{FF2B5EF4-FFF2-40B4-BE49-F238E27FC236}">
+                    <a16:creationId xmlns:a16="http://schemas.microsoft.com/office/drawing/2014/main" id="{B29E550D-906A-4336-BA71-9E8F021BF747}"/>
+                  </a:ext>
+                </a:extLst>
+              </p:cNvPr>
+              <p:cNvSpPr txBox="1">
+                <a:spLocks/>
+              </p:cNvSpPr>
+              <p:nvPr/>
+            </p:nvSpPr>
+            <p:spPr>
+              <a:xfrm>
+                <a:off x="0" y="3269813"/>
+                <a:ext cx="6769100" cy="1191498"/>
+              </a:xfrm>
+              <a:prstGeom prst="rect">
+                <a:avLst/>
+              </a:prstGeom>
+            </p:spPr>
+            <p:txBody>
+              <a:bodyPr vert="horz" lIns="91440" tIns="45720" rIns="91440" bIns="45720" rtlCol="0">
+                <a:normAutofit/>
+              </a:bodyPr>
+              <a:lstStyle>
+                <a:lvl1pPr marL="228600" indent="-228600" algn="l" defTabSz="914400" rtl="0" eaLnBrk="1" latinLnBrk="0" hangingPunct="1">
+                  <a:lnSpc>
+                    <a:spcPct val="90000"/>
+                  </a:lnSpc>
+                  <a:spcBef>
+                    <a:spcPts val="1000"/>
+                  </a:spcBef>
+                  <a:buFont typeface="Arial" panose="020B0604020202020204" pitchFamily="34" charset="0"/>
+                  <a:buChar char="•"/>
+                  <a:defRPr sz="2800" kern="1200">
+                    <a:solidFill>
+                      <a:schemeClr val="tx1"/>
+                    </a:solidFill>
+                    <a:latin typeface="+mn-lt"/>
+                    <a:ea typeface="+mn-ea"/>
+                    <a:cs typeface="+mn-cs"/>
+                  </a:defRPr>
+                </a:lvl1pPr>
+                <a:lvl2pPr marL="685800" indent="-228600" algn="l" defTabSz="914400" rtl="0" eaLnBrk="1" latinLnBrk="0" hangingPunct="1">
+                  <a:lnSpc>
+                    <a:spcPct val="90000"/>
+                  </a:lnSpc>
+                  <a:spcBef>
+                    <a:spcPts val="500"/>
+                  </a:spcBef>
+                  <a:buFont typeface="Arial" panose="020B0604020202020204" pitchFamily="34" charset="0"/>
+                  <a:buChar char="•"/>
+                  <a:defRPr sz="2400" kern="1200">
+                    <a:solidFill>
+                      <a:schemeClr val="tx1"/>
+                    </a:solidFill>
+                    <a:latin typeface="+mn-lt"/>
+                    <a:ea typeface="+mn-ea"/>
+                    <a:cs typeface="+mn-cs"/>
+                  </a:defRPr>
+                </a:lvl2pPr>
+                <a:lvl3pPr marL="1143000" indent="-228600" algn="l" defTabSz="914400" rtl="0" eaLnBrk="1" latinLnBrk="0" hangingPunct="1">
+                  <a:lnSpc>
+                    <a:spcPct val="90000"/>
+                  </a:lnSpc>
+                  <a:spcBef>
+                    <a:spcPts val="500"/>
+                  </a:spcBef>
+                  <a:buFont typeface="Arial" panose="020B0604020202020204" pitchFamily="34" charset="0"/>
+                  <a:buChar char="•"/>
+                  <a:defRPr sz="2000" kern="1200">
+                    <a:solidFill>
+                      <a:schemeClr val="tx1"/>
+                    </a:solidFill>
+                    <a:latin typeface="+mn-lt"/>
+                    <a:ea typeface="+mn-ea"/>
+                    <a:cs typeface="+mn-cs"/>
+                  </a:defRPr>
+                </a:lvl3pPr>
+                <a:lvl4pPr marL="1600200" indent="-228600" algn="l" defTabSz="914400" rtl="0" eaLnBrk="1" latinLnBrk="0" hangingPunct="1">
+                  <a:lnSpc>
+                    <a:spcPct val="90000"/>
+                  </a:lnSpc>
+                  <a:spcBef>
+                    <a:spcPts val="500"/>
+                  </a:spcBef>
+                  <a:buFont typeface="Arial" panose="020B0604020202020204" pitchFamily="34" charset="0"/>
+                  <a:buChar char="•"/>
+                  <a:defRPr sz="1800" kern="1200">
+                    <a:solidFill>
+                      <a:schemeClr val="tx1"/>
+                    </a:solidFill>
+                    <a:latin typeface="+mn-lt"/>
+                    <a:ea typeface="+mn-ea"/>
+                    <a:cs typeface="+mn-cs"/>
+                  </a:defRPr>
+                </a:lvl4pPr>
+                <a:lvl5pPr marL="2057400" indent="-228600" algn="l" defTabSz="914400" rtl="0" eaLnBrk="1" latinLnBrk="0" hangingPunct="1">
+                  <a:lnSpc>
+                    <a:spcPct val="90000"/>
+                  </a:lnSpc>
+                  <a:spcBef>
+                    <a:spcPts val="500"/>
+                  </a:spcBef>
+                  <a:buFont typeface="Arial" panose="020B0604020202020204" pitchFamily="34" charset="0"/>
+                  <a:buChar char="•"/>
+                  <a:defRPr sz="1800" kern="1200">
+                    <a:solidFill>
+                      <a:schemeClr val="tx1"/>
+                    </a:solidFill>
+                    <a:latin typeface="+mn-lt"/>
+                    <a:ea typeface="+mn-ea"/>
+                    <a:cs typeface="+mn-cs"/>
+                  </a:defRPr>
+                </a:lvl5pPr>
+                <a:lvl6pPr marL="2514600" indent="-228600" algn="l" defTabSz="914400" rtl="0" eaLnBrk="1" latinLnBrk="0" hangingPunct="1">
+                  <a:lnSpc>
+                    <a:spcPct val="90000"/>
+                  </a:lnSpc>
+                  <a:spcBef>
+                    <a:spcPts val="500"/>
+                  </a:spcBef>
+                  <a:buFont typeface="Arial" panose="020B0604020202020204" pitchFamily="34" charset="0"/>
+                  <a:buChar char="•"/>
+                  <a:defRPr sz="1800" kern="1200">
+                    <a:solidFill>
+                      <a:schemeClr val="tx1"/>
+                    </a:solidFill>
+                    <a:latin typeface="+mn-lt"/>
+                    <a:ea typeface="+mn-ea"/>
+                    <a:cs typeface="+mn-cs"/>
+                  </a:defRPr>
+                </a:lvl6pPr>
+                <a:lvl7pPr marL="2971800" indent="-228600" algn="l" defTabSz="914400" rtl="0" eaLnBrk="1" latinLnBrk="0" hangingPunct="1">
+                  <a:lnSpc>
+                    <a:spcPct val="90000"/>
+                  </a:lnSpc>
+                  <a:spcBef>
+                    <a:spcPts val="500"/>
+                  </a:spcBef>
+                  <a:buFont typeface="Arial" panose="020B0604020202020204" pitchFamily="34" charset="0"/>
+                  <a:buChar char="•"/>
+                  <a:defRPr sz="1800" kern="1200">
+                    <a:solidFill>
+                      <a:schemeClr val="tx1"/>
+                    </a:solidFill>
+                    <a:latin typeface="+mn-lt"/>
+                    <a:ea typeface="+mn-ea"/>
+                    <a:cs typeface="+mn-cs"/>
+                  </a:defRPr>
+                </a:lvl7pPr>
+                <a:lvl8pPr marL="3429000" indent="-228600" algn="l" defTabSz="914400" rtl="0" eaLnBrk="1" latinLnBrk="0" hangingPunct="1">
+                  <a:lnSpc>
+                    <a:spcPct val="90000"/>
+                  </a:lnSpc>
+                  <a:spcBef>
+                    <a:spcPts val="500"/>
+                  </a:spcBef>
+                  <a:buFont typeface="Arial" panose="020B0604020202020204" pitchFamily="34" charset="0"/>
+                  <a:buChar char="•"/>
+                  <a:defRPr sz="1800" kern="1200">
+                    <a:solidFill>
+                      <a:schemeClr val="tx1"/>
+                    </a:solidFill>
+                    <a:latin typeface="+mn-lt"/>
+                    <a:ea typeface="+mn-ea"/>
+                    <a:cs typeface="+mn-cs"/>
+                  </a:defRPr>
+                </a:lvl8pPr>
+                <a:lvl9pPr marL="3886200" indent="-228600" algn="l" defTabSz="914400" rtl="0" eaLnBrk="1" latinLnBrk="0" hangingPunct="1">
+                  <a:lnSpc>
+                    <a:spcPct val="90000"/>
+                  </a:lnSpc>
+                  <a:spcBef>
+                    <a:spcPts val="500"/>
+                  </a:spcBef>
+                  <a:buFont typeface="Arial" panose="020B0604020202020204" pitchFamily="34" charset="0"/>
+                  <a:buChar char="•"/>
+                  <a:defRPr sz="1800" kern="1200">
+                    <a:solidFill>
+                      <a:schemeClr val="tx1"/>
+                    </a:solidFill>
+                    <a:latin typeface="+mn-lt"/>
+                    <a:ea typeface="+mn-ea"/>
+                    <a:cs typeface="+mn-cs"/>
+                  </a:defRPr>
+                </a:lvl9pPr>
+              </a:lstStyle>
+              <a:p>
+                <a:pPr marL="0" indent="0">
+                  <a:buNone/>
+                </a:pPr>
+                <a14:m>
+                  <m:oMathPara xmlns:m="http://schemas.openxmlformats.org/officeDocument/2006/math">
+                    <m:oMathParaPr>
+                      <m:jc m:val="centerGroup"/>
+                    </m:oMathParaPr>
+                    <m:oMath xmlns:m="http://schemas.openxmlformats.org/officeDocument/2006/math">
+                      <m:sSub>
+                        <m:sSubPr>
+                          <m:ctrlPr>
+                            <a:rPr lang="en-US" i="1" smtClean="0">
+                              <a:latin typeface="Cambria Math" panose="02040503050406030204" pitchFamily="18" charset="0"/>
+                            </a:rPr>
+                          </m:ctrlPr>
+                        </m:sSubPr>
+                        <m:e>
+                          <m:r>
+                            <a:rPr lang="en-US" b="0" i="1" smtClean="0">
+                              <a:latin typeface="Cambria Math" panose="02040503050406030204" pitchFamily="18" charset="0"/>
+                            </a:rPr>
+                            <m:t>𝑓</m:t>
+                          </m:r>
+                        </m:e>
+                        <m:sub>
+                          <m:r>
+                            <a:rPr lang="en-US" b="0" i="1" smtClean="0">
+                              <a:latin typeface="Cambria Math" panose="02040503050406030204" pitchFamily="18" charset="0"/>
+                            </a:rPr>
+                            <m:t>𝑚𝑎𝑥</m:t>
+                          </m:r>
+                        </m:sub>
+                      </m:sSub>
+                      <m:d>
+                        <m:dPr>
+                          <m:ctrlPr>
+                            <a:rPr lang="en-US" i="1" smtClean="0">
+                              <a:latin typeface="Cambria Math" panose="02040503050406030204" pitchFamily="18" charset="0"/>
+                            </a:rPr>
+                          </m:ctrlPr>
+                        </m:dPr>
+                        <m:e>
+                          <m:r>
+                            <a:rPr lang="en-US" b="0" i="1" smtClean="0">
+                              <a:latin typeface="Cambria Math" panose="02040503050406030204" pitchFamily="18" charset="0"/>
+                            </a:rPr>
+                            <m:t>𝐻𝑅</m:t>
+                          </m:r>
+                        </m:e>
+                      </m:d>
+                      <m:r>
+                        <a:rPr lang="pt-BR" i="1" smtClean="0">
+                          <a:latin typeface="Cambria Math" panose="02040503050406030204" pitchFamily="18" charset="0"/>
+                        </a:rPr>
+                        <m:t>=</m:t>
+                      </m:r>
+                      <m:r>
+                        <a:rPr lang="en-US" b="0" i="1" smtClean="0">
+                          <a:latin typeface="Cambria Math" panose="02040503050406030204" pitchFamily="18" charset="0"/>
+                        </a:rPr>
+                        <m:t>1−</m:t>
+                      </m:r>
+                      <m:sSup>
+                        <m:sSupPr>
+                          <m:ctrlPr>
+                            <a:rPr lang="en-US" b="0" i="1" smtClean="0">
+                              <a:latin typeface="Cambria Math" panose="02040503050406030204" pitchFamily="18" charset="0"/>
+                            </a:rPr>
+                          </m:ctrlPr>
+                        </m:sSupPr>
+                        <m:e>
+                          <m:r>
+                            <a:rPr lang="en-US" b="0" i="1" smtClean="0">
+                              <a:latin typeface="Cambria Math" panose="02040503050406030204" pitchFamily="18" charset="0"/>
+                            </a:rPr>
+                            <m:t>𝑒</m:t>
+                          </m:r>
+                        </m:e>
+                        <m:sup>
+                          <m:sSup>
+                            <m:sSupPr>
+                              <m:ctrlPr>
+                                <a:rPr lang="en-US" b="0" i="1" smtClean="0">
+                                  <a:latin typeface="Cambria Math" panose="02040503050406030204" pitchFamily="18" charset="0"/>
+                                </a:rPr>
+                              </m:ctrlPr>
+                            </m:sSupPr>
+                            <m:e>
+                              <m:r>
+                                <a:rPr lang="en-US" i="1">
+                                  <a:latin typeface="Cambria Math" panose="02040503050406030204" pitchFamily="18" charset="0"/>
+                                </a:rPr>
+                                <m:t>−(</m:t>
+                              </m:r>
+                              <m:f>
+                                <m:fPr>
+                                  <m:ctrlPr>
+                                    <a:rPr lang="en-US" i="1">
+                                      <a:latin typeface="Cambria Math" panose="02040503050406030204" pitchFamily="18" charset="0"/>
+                                    </a:rPr>
+                                  </m:ctrlPr>
+                                </m:fPr>
+                                <m:num>
+                                  <m:r>
+                                    <a:rPr lang="en-US" i="1">
+                                      <a:latin typeface="Cambria Math" panose="02040503050406030204" pitchFamily="18" charset="0"/>
+                                    </a:rPr>
+                                    <m:t>𝐻𝑅</m:t>
+                                  </m:r>
+                                  <m:r>
+                                    <a:rPr lang="en-US" i="1">
+                                      <a:latin typeface="Cambria Math" panose="02040503050406030204" pitchFamily="18" charset="0"/>
+                                    </a:rPr>
+                                    <m:t>−</m:t>
+                                  </m:r>
+                                  <m:sSub>
+                                    <m:sSubPr>
+                                      <m:ctrlPr>
+                                        <a:rPr lang="en-US" i="1">
+                                          <a:latin typeface="Cambria Math" panose="02040503050406030204" pitchFamily="18" charset="0"/>
+                                        </a:rPr>
+                                      </m:ctrlPr>
+                                    </m:sSubPr>
+                                    <m:e>
+                                      <m:r>
+                                        <a:rPr lang="en-US" i="1">
+                                          <a:latin typeface="Cambria Math" panose="02040503050406030204" pitchFamily="18" charset="0"/>
+                                        </a:rPr>
+                                        <m:t>𝐻𝑅</m:t>
+                                      </m:r>
+                                    </m:e>
+                                    <m:sub>
+                                      <m:r>
+                                        <a:rPr lang="en-US" i="1">
+                                          <a:latin typeface="Cambria Math" panose="02040503050406030204" pitchFamily="18" charset="0"/>
+                                        </a:rPr>
+                                        <m:t>𝑚𝑎𝑥</m:t>
+                                      </m:r>
+                                    </m:sub>
+                                  </m:sSub>
+                                </m:num>
+                                <m:den>
+                                  <m:r>
+                                    <a:rPr lang="en-US" i="1">
+                                      <a:latin typeface="Cambria Math" panose="02040503050406030204" pitchFamily="18" charset="0"/>
+                                    </a:rPr>
+                                    <m:t>10</m:t>
+                                  </m:r>
+                                </m:den>
+                              </m:f>
+                              <m:r>
+                                <a:rPr lang="en-US" b="0" i="1" smtClean="0">
+                                  <a:latin typeface="Cambria Math" panose="02040503050406030204" pitchFamily="18" charset="0"/>
+                                </a:rPr>
+                                <m:t>)</m:t>
+                              </m:r>
+                            </m:e>
+                            <m:sup>
+                              <m:r>
+                                <a:rPr lang="en-US" b="0" i="1" smtClean="0">
+                                  <a:latin typeface="Cambria Math" panose="02040503050406030204" pitchFamily="18" charset="0"/>
+                                </a:rPr>
+                                <m:t>2</m:t>
+                              </m:r>
+                            </m:sup>
+                          </m:sSup>
+                        </m:sup>
+                      </m:sSup>
+                    </m:oMath>
+                  </m:oMathPara>
+                </a14:m>
+                <a:endParaRPr lang="en-US" dirty="0"/>
+              </a:p>
+            </p:txBody>
+          </p:sp>
+        </mc:Choice>
+        <mc:Fallback>
+          <p:sp>
+            <p:nvSpPr>
+              <p:cNvPr id="5" name="Content Placeholder 2">
+                <a:extLst>
+                  <a:ext uri="{FF2B5EF4-FFF2-40B4-BE49-F238E27FC236}">
+                    <a16:creationId xmlns:a16="http://schemas.microsoft.com/office/drawing/2014/main" id="{B29E550D-906A-4336-BA71-9E8F021BF747}"/>
+                  </a:ext>
+                </a:extLst>
+              </p:cNvPr>
+              <p:cNvSpPr txBox="1">
+                <a:spLocks noRot="1" noChangeAspect="1" noMove="1" noResize="1" noEditPoints="1" noAdjustHandles="1" noChangeArrowheads="1" noChangeShapeType="1" noTextEdit="1"/>
+              </p:cNvSpPr>
+              <p:nvPr/>
+            </p:nvSpPr>
+            <p:spPr>
+              <a:xfrm>
+                <a:off x="0" y="3269813"/>
+                <a:ext cx="6769100" cy="1191498"/>
+              </a:xfrm>
+              <a:prstGeom prst="rect">
+                <a:avLst/>
+              </a:prstGeom>
+              <a:blipFill>
+                <a:blip r:embed="rId3"/>
+                <a:stretch>
+                  <a:fillRect/>
+                </a:stretch>
+              </a:blipFill>
+            </p:spPr>
+            <p:txBody>
+              <a:bodyPr/>
+              <a:lstStyle/>
+              <a:p>
+                <a:r>
+                  <a:rPr lang="en-US">
+                    <a:noFill/>
+                  </a:rPr>
+                  <a:t> </a:t>
+                </a:r>
+              </a:p>
+            </p:txBody>
+          </p:sp>
+        </mc:Fallback>
+      </mc:AlternateContent>
+      <mc:AlternateContent xmlns:mc="http://schemas.openxmlformats.org/markup-compatibility/2006">
+        <mc:Choice xmlns:a14="http://schemas.microsoft.com/office/drawing/2010/main" Requires="a14">
+          <p:sp>
+            <p:nvSpPr>
+              <p:cNvPr id="6" name="Content Placeholder 2">
+                <a:extLst>
+                  <a:ext uri="{FF2B5EF4-FFF2-40B4-BE49-F238E27FC236}">
+                    <a16:creationId xmlns:a16="http://schemas.microsoft.com/office/drawing/2014/main" id="{1757093B-8DCF-43B2-9BC3-3028B6254A99}"/>
+                  </a:ext>
+                </a:extLst>
+              </p:cNvPr>
+              <p:cNvSpPr txBox="1">
+                <a:spLocks/>
+              </p:cNvSpPr>
+              <p:nvPr/>
+            </p:nvSpPr>
+            <p:spPr>
+              <a:xfrm>
+                <a:off x="4724400" y="1825625"/>
+                <a:ext cx="4089400" cy="984687"/>
+              </a:xfrm>
+              <a:prstGeom prst="rect">
+                <a:avLst/>
+              </a:prstGeom>
+            </p:spPr>
+            <p:txBody>
+              <a:bodyPr vert="horz" lIns="91440" tIns="45720" rIns="91440" bIns="45720" rtlCol="0">
+                <a:normAutofit fontScale="77500" lnSpcReduction="20000"/>
+              </a:bodyPr>
+              <a:lstStyle>
+                <a:lvl1pPr marL="228600" indent="-228600" algn="l" defTabSz="914400" rtl="0" eaLnBrk="1" latinLnBrk="0" hangingPunct="1">
+                  <a:lnSpc>
+                    <a:spcPct val="90000"/>
+                  </a:lnSpc>
+                  <a:spcBef>
+                    <a:spcPts val="1000"/>
+                  </a:spcBef>
+                  <a:buFont typeface="Arial" panose="020B0604020202020204" pitchFamily="34" charset="0"/>
+                  <a:buChar char="•"/>
+                  <a:defRPr sz="2800" kern="1200">
+                    <a:solidFill>
+                      <a:schemeClr val="tx1"/>
+                    </a:solidFill>
+                    <a:latin typeface="+mn-lt"/>
+                    <a:ea typeface="+mn-ea"/>
+                    <a:cs typeface="+mn-cs"/>
+                  </a:defRPr>
+                </a:lvl1pPr>
+                <a:lvl2pPr marL="685800" indent="-228600" algn="l" defTabSz="914400" rtl="0" eaLnBrk="1" latinLnBrk="0" hangingPunct="1">
+                  <a:lnSpc>
+                    <a:spcPct val="90000"/>
+                  </a:lnSpc>
+                  <a:spcBef>
+                    <a:spcPts val="500"/>
+                  </a:spcBef>
+                  <a:buFont typeface="Arial" panose="020B0604020202020204" pitchFamily="34" charset="0"/>
+                  <a:buChar char="•"/>
+                  <a:defRPr sz="2400" kern="1200">
+                    <a:solidFill>
+                      <a:schemeClr val="tx1"/>
+                    </a:solidFill>
+                    <a:latin typeface="+mn-lt"/>
+                    <a:ea typeface="+mn-ea"/>
+                    <a:cs typeface="+mn-cs"/>
+                  </a:defRPr>
+                </a:lvl2pPr>
+                <a:lvl3pPr marL="1143000" indent="-228600" algn="l" defTabSz="914400" rtl="0" eaLnBrk="1" latinLnBrk="0" hangingPunct="1">
+                  <a:lnSpc>
+                    <a:spcPct val="90000"/>
+                  </a:lnSpc>
+                  <a:spcBef>
+                    <a:spcPts val="500"/>
+                  </a:spcBef>
+                  <a:buFont typeface="Arial" panose="020B0604020202020204" pitchFamily="34" charset="0"/>
+                  <a:buChar char="•"/>
+                  <a:defRPr sz="2000" kern="1200">
+                    <a:solidFill>
+                      <a:schemeClr val="tx1"/>
+                    </a:solidFill>
+                    <a:latin typeface="+mn-lt"/>
+                    <a:ea typeface="+mn-ea"/>
+                    <a:cs typeface="+mn-cs"/>
+                  </a:defRPr>
+                </a:lvl3pPr>
+                <a:lvl4pPr marL="1600200" indent="-228600" algn="l" defTabSz="914400" rtl="0" eaLnBrk="1" latinLnBrk="0" hangingPunct="1">
+                  <a:lnSpc>
+                    <a:spcPct val="90000"/>
+                  </a:lnSpc>
+                  <a:spcBef>
+                    <a:spcPts val="500"/>
+                  </a:spcBef>
+                  <a:buFont typeface="Arial" panose="020B0604020202020204" pitchFamily="34" charset="0"/>
+                  <a:buChar char="•"/>
+                  <a:defRPr sz="1800" kern="1200">
+                    <a:solidFill>
+                      <a:schemeClr val="tx1"/>
+                    </a:solidFill>
+                    <a:latin typeface="+mn-lt"/>
+                    <a:ea typeface="+mn-ea"/>
+                    <a:cs typeface="+mn-cs"/>
+                  </a:defRPr>
+                </a:lvl4pPr>
+                <a:lvl5pPr marL="2057400" indent="-228600" algn="l" defTabSz="914400" rtl="0" eaLnBrk="1" latinLnBrk="0" hangingPunct="1">
+                  <a:lnSpc>
+                    <a:spcPct val="90000"/>
+                  </a:lnSpc>
+                  <a:spcBef>
+                    <a:spcPts val="500"/>
+                  </a:spcBef>
+                  <a:buFont typeface="Arial" panose="020B0604020202020204" pitchFamily="34" charset="0"/>
+                  <a:buChar char="•"/>
+                  <a:defRPr sz="1800" kern="1200">
+                    <a:solidFill>
+                      <a:schemeClr val="tx1"/>
+                    </a:solidFill>
+                    <a:latin typeface="+mn-lt"/>
+                    <a:ea typeface="+mn-ea"/>
+                    <a:cs typeface="+mn-cs"/>
+                  </a:defRPr>
+                </a:lvl5pPr>
+                <a:lvl6pPr marL="2514600" indent="-228600" algn="l" defTabSz="914400" rtl="0" eaLnBrk="1" latinLnBrk="0" hangingPunct="1">
+                  <a:lnSpc>
+                    <a:spcPct val="90000"/>
+                  </a:lnSpc>
+                  <a:spcBef>
+                    <a:spcPts val="500"/>
+                  </a:spcBef>
+                  <a:buFont typeface="Arial" panose="020B0604020202020204" pitchFamily="34" charset="0"/>
+                  <a:buChar char="•"/>
+                  <a:defRPr sz="1800" kern="1200">
+                    <a:solidFill>
+                      <a:schemeClr val="tx1"/>
+                    </a:solidFill>
+                    <a:latin typeface="+mn-lt"/>
+                    <a:ea typeface="+mn-ea"/>
+                    <a:cs typeface="+mn-cs"/>
+                  </a:defRPr>
+                </a:lvl6pPr>
+                <a:lvl7pPr marL="2971800" indent="-228600" algn="l" defTabSz="914400" rtl="0" eaLnBrk="1" latinLnBrk="0" hangingPunct="1">
+                  <a:lnSpc>
+                    <a:spcPct val="90000"/>
+                  </a:lnSpc>
+                  <a:spcBef>
+                    <a:spcPts val="500"/>
+                  </a:spcBef>
+                  <a:buFont typeface="Arial" panose="020B0604020202020204" pitchFamily="34" charset="0"/>
+                  <a:buChar char="•"/>
+                  <a:defRPr sz="1800" kern="1200">
+                    <a:solidFill>
+                      <a:schemeClr val="tx1"/>
+                    </a:solidFill>
+                    <a:latin typeface="+mn-lt"/>
+                    <a:ea typeface="+mn-ea"/>
+                    <a:cs typeface="+mn-cs"/>
+                  </a:defRPr>
+                </a:lvl7pPr>
+                <a:lvl8pPr marL="3429000" indent="-228600" algn="l" defTabSz="914400" rtl="0" eaLnBrk="1" latinLnBrk="0" hangingPunct="1">
+                  <a:lnSpc>
+                    <a:spcPct val="90000"/>
+                  </a:lnSpc>
+                  <a:spcBef>
+                    <a:spcPts val="500"/>
+                  </a:spcBef>
+                  <a:buFont typeface="Arial" panose="020B0604020202020204" pitchFamily="34" charset="0"/>
+                  <a:buChar char="•"/>
+                  <a:defRPr sz="1800" kern="1200">
+                    <a:solidFill>
+                      <a:schemeClr val="tx1"/>
+                    </a:solidFill>
+                    <a:latin typeface="+mn-lt"/>
+                    <a:ea typeface="+mn-ea"/>
+                    <a:cs typeface="+mn-cs"/>
+                  </a:defRPr>
+                </a:lvl8pPr>
+                <a:lvl9pPr marL="3886200" indent="-228600" algn="l" defTabSz="914400" rtl="0" eaLnBrk="1" latinLnBrk="0" hangingPunct="1">
+                  <a:lnSpc>
+                    <a:spcPct val="90000"/>
+                  </a:lnSpc>
+                  <a:spcBef>
+                    <a:spcPts val="500"/>
+                  </a:spcBef>
+                  <a:buFont typeface="Arial" panose="020B0604020202020204" pitchFamily="34" charset="0"/>
+                  <a:buChar char="•"/>
+                  <a:defRPr sz="1800" kern="1200">
+                    <a:solidFill>
+                      <a:schemeClr val="tx1"/>
+                    </a:solidFill>
+                    <a:latin typeface="+mn-lt"/>
+                    <a:ea typeface="+mn-ea"/>
+                    <a:cs typeface="+mn-cs"/>
+                  </a:defRPr>
+                </a:lvl9pPr>
+              </a:lstStyle>
+              <a:p>
+                <a:pPr marL="0" indent="0">
+                  <a:buFont typeface="Arial" panose="020B0604020202020204" pitchFamily="34" charset="0"/>
+                  <a:buNone/>
+                </a:pPr>
+                <a14:m>
+                  <m:oMathPara xmlns:m="http://schemas.openxmlformats.org/officeDocument/2006/math">
+                    <m:oMathParaPr>
+                      <m:jc m:val="centerGroup"/>
+                    </m:oMathParaPr>
+                    <m:oMath xmlns:m="http://schemas.openxmlformats.org/officeDocument/2006/math">
+                      <m:r>
+                        <a:rPr lang="en-US" b="0" i="1" smtClean="0">
+                          <a:latin typeface="Cambria Math" panose="02040503050406030204" pitchFamily="18" charset="0"/>
+                        </a:rPr>
+                        <m:t>⇒</m:t>
+                      </m:r>
+                      <m:r>
+                        <a:rPr lang="en-US" i="1" smtClean="0">
+                          <a:latin typeface="Cambria Math" panose="02040503050406030204" pitchFamily="18" charset="0"/>
+                        </a:rPr>
+                        <m:t>𝑓</m:t>
+                      </m:r>
+                      <m:r>
+                        <a:rPr lang="en-US" i="1" smtClean="0">
+                          <a:latin typeface="Cambria Math" panose="02040503050406030204" pitchFamily="18" charset="0"/>
+                        </a:rPr>
+                        <m:t>(</m:t>
+                      </m:r>
+                      <m:r>
+                        <m:rPr>
+                          <m:sty m:val="p"/>
+                        </m:rPr>
+                        <a:rPr lang="el-GR" i="1" smtClean="0">
+                          <a:latin typeface="Cambria Math" panose="02040503050406030204" pitchFamily="18" charset="0"/>
+                        </a:rPr>
+                        <m:t>λ</m:t>
+                      </m:r>
+                      <m:r>
+                        <a:rPr lang="en-US" i="1" smtClean="0">
+                          <a:latin typeface="Cambria Math" panose="02040503050406030204" pitchFamily="18" charset="0"/>
+                        </a:rPr>
+                        <m:t>)</m:t>
+                      </m:r>
+                      <m:r>
+                        <a:rPr lang="pt-BR" i="1" smtClean="0">
+                          <a:latin typeface="Cambria Math" panose="02040503050406030204" pitchFamily="18" charset="0"/>
+                        </a:rPr>
+                        <m:t>=</m:t>
+                      </m:r>
+                      <m:nary>
+                        <m:naryPr>
+                          <m:chr m:val="∑"/>
+                          <m:ctrlPr>
+                            <a:rPr lang="pt-BR" i="1" smtClean="0">
+                              <a:latin typeface="Cambria Math" panose="02040503050406030204" pitchFamily="18" charset="0"/>
+                            </a:rPr>
+                          </m:ctrlPr>
+                        </m:naryPr>
+                        <m:sub>
+                          <m:r>
+                            <a:rPr lang="en-US" i="1" smtClean="0">
+                              <a:latin typeface="Cambria Math" panose="02040503050406030204" pitchFamily="18" charset="0"/>
+                            </a:rPr>
+                            <m:t>𝑖</m:t>
+                          </m:r>
+                          <m:r>
+                            <a:rPr lang="pt-BR" i="1" smtClean="0">
+                              <a:latin typeface="Cambria Math" panose="02040503050406030204" pitchFamily="18" charset="0"/>
+                            </a:rPr>
+                            <m:t>=</m:t>
+                          </m:r>
+                          <m:r>
+                            <a:rPr lang="en-US" i="1" smtClean="0">
+                              <a:latin typeface="Cambria Math" panose="02040503050406030204" pitchFamily="18" charset="0"/>
+                            </a:rPr>
+                            <m:t>1</m:t>
+                          </m:r>
+                        </m:sub>
+                        <m:sup>
+                          <m:r>
+                            <a:rPr lang="pt-BR" i="1" smtClean="0">
+                              <a:latin typeface="Cambria Math" panose="02040503050406030204" pitchFamily="18" charset="0"/>
+                            </a:rPr>
+                            <m:t>𝑛</m:t>
+                          </m:r>
+                        </m:sup>
+                        <m:e>
+                          <m:sSup>
+                            <m:sSupPr>
+                              <m:ctrlPr>
+                                <a:rPr lang="pt-BR" i="1" smtClean="0">
+                                  <a:latin typeface="Cambria Math" panose="02040503050406030204" pitchFamily="18" charset="0"/>
+                                </a:rPr>
+                              </m:ctrlPr>
+                            </m:sSupPr>
+                            <m:e>
+                              <m:d>
+                                <m:dPr>
+                                  <m:ctrlPr>
+                                    <a:rPr lang="pt-BR" i="1">
+                                      <a:latin typeface="Cambria Math" panose="02040503050406030204" pitchFamily="18" charset="0"/>
+                                    </a:rPr>
+                                  </m:ctrlPr>
+                                </m:dPr>
+                                <m:e>
+                                  <m:sSub>
+                                    <m:sSubPr>
+                                      <m:ctrlPr>
+                                        <a:rPr lang="en-US" i="1">
+                                          <a:latin typeface="Cambria Math" panose="02040503050406030204" pitchFamily="18" charset="0"/>
+                                        </a:rPr>
+                                      </m:ctrlPr>
+                                    </m:sSubPr>
+                                    <m:e>
+                                      <m:r>
+                                        <a:rPr lang="en-US" i="1">
+                                          <a:latin typeface="Cambria Math" panose="02040503050406030204" pitchFamily="18" charset="0"/>
+                                        </a:rPr>
+                                        <m:t>𝐻𝑅</m:t>
+                                      </m:r>
+                                    </m:e>
+                                    <m:sub>
+                                      <m:r>
+                                        <a:rPr lang="en-US" i="1">
+                                          <a:latin typeface="Cambria Math" panose="02040503050406030204" pitchFamily="18" charset="0"/>
+                                        </a:rPr>
+                                        <m:t>𝑖</m:t>
+                                      </m:r>
+                                    </m:sub>
+                                  </m:sSub>
+                                  <m:r>
+                                    <a:rPr lang="en-US" i="1">
+                                      <a:latin typeface="Cambria Math" panose="02040503050406030204" pitchFamily="18" charset="0"/>
+                                    </a:rPr>
+                                    <m:t>−</m:t>
+                                  </m:r>
+                                  <m:sSubSup>
+                                    <m:sSubSupPr>
+                                      <m:ctrlPr>
+                                        <a:rPr lang="en-US" i="1">
+                                          <a:latin typeface="Cambria Math" panose="02040503050406030204" pitchFamily="18" charset="0"/>
+                                        </a:rPr>
+                                      </m:ctrlPr>
+                                    </m:sSubSupPr>
+                                    <m:e>
+                                      <m:r>
+                                        <a:rPr lang="en-US" i="1">
+                                          <a:latin typeface="Cambria Math" panose="02040503050406030204" pitchFamily="18" charset="0"/>
+                                        </a:rPr>
+                                        <m:t>𝐻𝑅</m:t>
+                                      </m:r>
+                                    </m:e>
+                                    <m:sub>
+                                      <m:r>
+                                        <a:rPr lang="en-US" i="1">
+                                          <a:latin typeface="Cambria Math" panose="02040503050406030204" pitchFamily="18" charset="0"/>
+                                        </a:rPr>
+                                        <m:t>𝑖</m:t>
+                                      </m:r>
+                                    </m:sub>
+                                    <m:sup>
+                                      <m:r>
+                                        <a:rPr lang="en-US" i="1">
+                                          <a:latin typeface="Cambria Math" panose="02040503050406030204" pitchFamily="18" charset="0"/>
+                                        </a:rPr>
+                                        <m:t>𝑚</m:t>
+                                      </m:r>
+                                    </m:sup>
+                                  </m:sSubSup>
+                                </m:e>
+                              </m:d>
+                            </m:e>
+                            <m:sup>
+                              <m:r>
+                                <a:rPr lang="en-US" i="1" smtClean="0">
+                                  <a:latin typeface="Cambria Math" panose="02040503050406030204" pitchFamily="18" charset="0"/>
+                                </a:rPr>
+                                <m:t>2</m:t>
+                              </m:r>
+                            </m:sup>
+                          </m:sSup>
+                        </m:e>
+                      </m:nary>
+                    </m:oMath>
+                  </m:oMathPara>
+                </a14:m>
+                <a:endParaRPr lang="en-US" dirty="0"/>
+              </a:p>
+            </p:txBody>
+          </p:sp>
+        </mc:Choice>
+        <mc:Fallback>
+          <p:sp>
+            <p:nvSpPr>
+              <p:cNvPr id="6" name="Content Placeholder 2">
+                <a:extLst>
+                  <a:ext uri="{FF2B5EF4-FFF2-40B4-BE49-F238E27FC236}">
+                    <a16:creationId xmlns:a16="http://schemas.microsoft.com/office/drawing/2014/main" id="{1757093B-8DCF-43B2-9BC3-3028B6254A99}"/>
+                  </a:ext>
+                </a:extLst>
+              </p:cNvPr>
+              <p:cNvSpPr txBox="1">
+                <a:spLocks noRot="1" noChangeAspect="1" noMove="1" noResize="1" noEditPoints="1" noAdjustHandles="1" noChangeArrowheads="1" noChangeShapeType="1" noTextEdit="1"/>
+              </p:cNvSpPr>
+              <p:nvPr/>
+            </p:nvSpPr>
+            <p:spPr>
+              <a:xfrm>
+                <a:off x="4724400" y="1825625"/>
+                <a:ext cx="4089400" cy="984687"/>
+              </a:xfrm>
+              <a:prstGeom prst="rect">
+                <a:avLst/>
+              </a:prstGeom>
+              <a:blipFill>
+                <a:blip r:embed="rId4"/>
+                <a:stretch>
+                  <a:fillRect/>
+                </a:stretch>
+              </a:blipFill>
+            </p:spPr>
+            <p:txBody>
+              <a:bodyPr/>
+              <a:lstStyle/>
+              <a:p>
+                <a:r>
+                  <a:rPr lang="en-US">
+                    <a:noFill/>
+                  </a:rPr>
+                  <a:t> </a:t>
+                </a:r>
+              </a:p>
+            </p:txBody>
+          </p:sp>
+        </mc:Fallback>
+      </mc:AlternateContent>
+    </p:spTree>
+    <p:extLst>
+      <p:ext uri="{BB962C8B-B14F-4D97-AF65-F5344CB8AC3E}">
+        <p14:creationId xmlns:p14="http://schemas.microsoft.com/office/powerpoint/2010/main" val="4080612181"/>
+      </p:ext>
+    </p:extLst>
+  </p:cSld>
+  <p:clrMapOvr>
+    <a:masterClrMapping/>
+  </p:clrMapOvr>
+</p:sld>
+</file>
+
 <file path=ppt/theme/theme1.xml><?xml version="1.0" encoding="utf-8"?>
 <a:theme xmlns:a="http://schemas.openxmlformats.org/drawingml/2006/main" name="Office Theme">
   <a:themeElements>

</xml_diff>

<commit_message>
feature update: bokeh chart added to dashboard
</commit_message>
<xml_diff>
--- a/misc/Life Buddy Web App.pptx
+++ b/misc/Life Buddy Web App.pptx
@@ -14,7 +14,9 @@
     <p:sldId id="261" r:id="rId8"/>
     <p:sldId id="262" r:id="rId9"/>
     <p:sldId id="264" r:id="rId10"/>
-    <p:sldId id="263" r:id="rId11"/>
+    <p:sldId id="266" r:id="rId11"/>
+    <p:sldId id="263" r:id="rId12"/>
+    <p:sldId id="267" r:id="rId13"/>
   </p:sldIdLst>
   <p:sldSz cx="12192000" cy="6858000"/>
   <p:notesSz cx="6858000" cy="9144000"/>
@@ -124,13 +126,115 @@
 <file path=ppt/revisionInfo.xml><?xml version="1.0" encoding="utf-8"?>
 <p1510:revInfo xmlns:a="http://schemas.openxmlformats.org/drawingml/2006/main" xmlns:r="http://schemas.openxmlformats.org/officeDocument/2006/relationships" xmlns:p1510="http://schemas.microsoft.com/office/powerpoint/2015/10/main">
   <p1510:revLst>
-    <p1510:client id="{E396DAB5-DBA8-4C3B-B27B-31FB2DF75A1E}" v="240" dt="2021-08-09T07:03:35.083"/>
+    <p1510:client id="{61D0E4F8-35B2-4445-9C68-7A7BC5B8BD76}" v="11" dt="2021-08-18T05:40:50.039"/>
   </p1510:revLst>
 </p1510:revInfo>
 </file>
 
 <file path=ppt/changesInfos/changesInfo1.xml><?xml version="1.0" encoding="utf-8"?>
 <pc:chgInfo xmlns:a="http://schemas.openxmlformats.org/drawingml/2006/main" xmlns:r="http://schemas.openxmlformats.org/officeDocument/2006/relationships" xmlns:ac="http://schemas.microsoft.com/office/drawing/2013/main/command" xmlns:pc="http://schemas.microsoft.com/office/powerpoint/2013/main/command">
+  <pc:docChgLst>
+    <pc:chgData name="Nick Rodriguez" userId="60df6d5feed7ac60" providerId="LiveId" clId="{61D0E4F8-35B2-4445-9C68-7A7BC5B8BD76}"/>
+    <pc:docChg chg="undo custSel addSld modSld">
+      <pc:chgData name="Nick Rodriguez" userId="60df6d5feed7ac60" providerId="LiveId" clId="{61D0E4F8-35B2-4445-9C68-7A7BC5B8BD76}" dt="2021-08-18T05:49:09.541" v="456" actId="20577"/>
+      <pc:docMkLst>
+        <pc:docMk/>
+      </pc:docMkLst>
+      <pc:sldChg chg="addSp delSp mod">
+        <pc:chgData name="Nick Rodriguez" userId="60df6d5feed7ac60" providerId="LiveId" clId="{61D0E4F8-35B2-4445-9C68-7A7BC5B8BD76}" dt="2021-08-17T11:22:07.385" v="249" actId="22"/>
+        <pc:sldMkLst>
+          <pc:docMk/>
+          <pc:sldMk cId="4080612181" sldId="263"/>
+        </pc:sldMkLst>
+        <pc:spChg chg="add del">
+          <ac:chgData name="Nick Rodriguez" userId="60df6d5feed7ac60" providerId="LiveId" clId="{61D0E4F8-35B2-4445-9C68-7A7BC5B8BD76}" dt="2021-08-17T11:22:07.385" v="249" actId="22"/>
+          <ac:spMkLst>
+            <pc:docMk/>
+            <pc:sldMk cId="4080612181" sldId="263"/>
+            <ac:spMk id="7" creationId="{5F4787B6-93BF-43C5-BA38-C167CEB9B7AC}"/>
+          </ac:spMkLst>
+        </pc:spChg>
+      </pc:sldChg>
+      <pc:sldChg chg="modSp add mod setBg">
+        <pc:chgData name="Nick Rodriguez" userId="60df6d5feed7ac60" providerId="LiveId" clId="{61D0E4F8-35B2-4445-9C68-7A7BC5B8BD76}" dt="2021-08-18T05:49:09.541" v="456" actId="20577"/>
+        <pc:sldMkLst>
+          <pc:docMk/>
+          <pc:sldMk cId="2460427629" sldId="266"/>
+        </pc:sldMkLst>
+        <pc:spChg chg="mod">
+          <ac:chgData name="Nick Rodriguez" userId="60df6d5feed7ac60" providerId="LiveId" clId="{61D0E4F8-35B2-4445-9C68-7A7BC5B8BD76}" dt="2021-08-17T03:32:52.999" v="3" actId="20577"/>
+          <ac:spMkLst>
+            <pc:docMk/>
+            <pc:sldMk cId="2460427629" sldId="266"/>
+            <ac:spMk id="2" creationId="{E2F8D61A-151A-41D4-ACD1-C7ACE57DA0FE}"/>
+          </ac:spMkLst>
+        </pc:spChg>
+        <pc:spChg chg="mod">
+          <ac:chgData name="Nick Rodriguez" userId="60df6d5feed7ac60" providerId="LiveId" clId="{61D0E4F8-35B2-4445-9C68-7A7BC5B8BD76}" dt="2021-08-18T05:49:09.541" v="456" actId="20577"/>
+          <ac:spMkLst>
+            <pc:docMk/>
+            <pc:sldMk cId="2460427629" sldId="266"/>
+            <ac:spMk id="3" creationId="{471E5327-8ED1-4525-8025-0617F94784D2}"/>
+          </ac:spMkLst>
+        </pc:spChg>
+      </pc:sldChg>
+      <pc:sldChg chg="addSp delSp modSp add mod">
+        <pc:chgData name="Nick Rodriguez" userId="60df6d5feed7ac60" providerId="LiveId" clId="{61D0E4F8-35B2-4445-9C68-7A7BC5B8BD76}" dt="2021-08-17T14:40:02.188" v="323" actId="20577"/>
+        <pc:sldMkLst>
+          <pc:docMk/>
+          <pc:sldMk cId="2267054047" sldId="267"/>
+        </pc:sldMkLst>
+        <pc:spChg chg="mod">
+          <ac:chgData name="Nick Rodriguez" userId="60df6d5feed7ac60" providerId="LiveId" clId="{61D0E4F8-35B2-4445-9C68-7A7BC5B8BD76}" dt="2021-08-17T11:22:58.845" v="295" actId="20577"/>
+          <ac:spMkLst>
+            <pc:docMk/>
+            <pc:sldMk cId="2267054047" sldId="267"/>
+            <ac:spMk id="2" creationId="{9732167D-70E6-492E-8CD4-228276C98778}"/>
+          </ac:spMkLst>
+        </pc:spChg>
+        <pc:spChg chg="mod">
+          <ac:chgData name="Nick Rodriguez" userId="60df6d5feed7ac60" providerId="LiveId" clId="{61D0E4F8-35B2-4445-9C68-7A7BC5B8BD76}" dt="2021-08-17T14:39:30.732" v="306" actId="1076"/>
+          <ac:spMkLst>
+            <pc:docMk/>
+            <pc:sldMk cId="2267054047" sldId="267"/>
+            <ac:spMk id="3" creationId="{AC3D23B7-A69F-4034-971F-9EFCD31B22C3}"/>
+          </ac:spMkLst>
+        </pc:spChg>
+        <pc:spChg chg="add mod">
+          <ac:chgData name="Nick Rodriguez" userId="60df6d5feed7ac60" providerId="LiveId" clId="{61D0E4F8-35B2-4445-9C68-7A7BC5B8BD76}" dt="2021-08-17T14:40:02.188" v="323" actId="20577"/>
+          <ac:spMkLst>
+            <pc:docMk/>
+            <pc:sldMk cId="2267054047" sldId="267"/>
+            <ac:spMk id="4" creationId="{16A92D4A-C192-498A-9AF5-165CBA52D7AF}"/>
+          </ac:spMkLst>
+        </pc:spChg>
+        <pc:spChg chg="del">
+          <ac:chgData name="Nick Rodriguez" userId="60df6d5feed7ac60" providerId="LiveId" clId="{61D0E4F8-35B2-4445-9C68-7A7BC5B8BD76}" dt="2021-08-17T14:39:28.311" v="305" actId="478"/>
+          <ac:spMkLst>
+            <pc:docMk/>
+            <pc:sldMk cId="2267054047" sldId="267"/>
+            <ac:spMk id="5" creationId="{B29E550D-906A-4336-BA71-9E8F021BF747}"/>
+          </ac:spMkLst>
+        </pc:spChg>
+        <pc:spChg chg="del">
+          <ac:chgData name="Nick Rodriguez" userId="60df6d5feed7ac60" providerId="LiveId" clId="{61D0E4F8-35B2-4445-9C68-7A7BC5B8BD76}" dt="2021-08-17T14:39:26.636" v="304" actId="478"/>
+          <ac:spMkLst>
+            <pc:docMk/>
+            <pc:sldMk cId="2267054047" sldId="267"/>
+            <ac:spMk id="6" creationId="{1757093B-8DCF-43B2-9BC3-3028B6254A99}"/>
+          </ac:spMkLst>
+        </pc:spChg>
+        <pc:picChg chg="add del">
+          <ac:chgData name="Nick Rodriguez" userId="60df6d5feed7ac60" providerId="LiveId" clId="{61D0E4F8-35B2-4445-9C68-7A7BC5B8BD76}" dt="2021-08-17T14:39:11.757" v="302"/>
+          <ac:picMkLst>
+            <pc:docMk/>
+            <pc:sldMk cId="2267054047" sldId="267"/>
+            <ac:picMk id="1026" creationId="{CDCC746C-8476-4392-AAC2-3AB007B38B9E}"/>
+          </ac:picMkLst>
+        </pc:picChg>
+      </pc:sldChg>
+    </pc:docChg>
+  </pc:docChgLst>
   <pc:docChgLst>
     <pc:chgData name="Nick Rodriguez" userId="60df6d5feed7ac60" providerId="LiveId" clId="{E396DAB5-DBA8-4C3B-B27B-31FB2DF75A1E}"/>
     <pc:docChg chg="undo custSel addSld modSld">
@@ -707,7 +811,7 @@
           <a:p>
             <a:fld id="{D57D165D-784C-428F-B501-6E9E9CABBFA2}" type="datetimeFigureOut">
               <a:rPr lang="en-US" smtClean="0"/>
-              <a:t>8/9/2021</a:t>
+              <a:t>8/17/2021</a:t>
             </a:fld>
             <a:endParaRPr lang="en-US"/>
           </a:p>
@@ -905,7 +1009,7 @@
           <a:p>
             <a:fld id="{D57D165D-784C-428F-B501-6E9E9CABBFA2}" type="datetimeFigureOut">
               <a:rPr lang="en-US" smtClean="0"/>
-              <a:t>8/9/2021</a:t>
+              <a:t>8/17/2021</a:t>
             </a:fld>
             <a:endParaRPr lang="en-US"/>
           </a:p>
@@ -1113,7 +1217,7 @@
           <a:p>
             <a:fld id="{D57D165D-784C-428F-B501-6E9E9CABBFA2}" type="datetimeFigureOut">
               <a:rPr lang="en-US" smtClean="0"/>
-              <a:t>8/9/2021</a:t>
+              <a:t>8/17/2021</a:t>
             </a:fld>
             <a:endParaRPr lang="en-US"/>
           </a:p>
@@ -1311,7 +1415,7 @@
           <a:p>
             <a:fld id="{D57D165D-784C-428F-B501-6E9E9CABBFA2}" type="datetimeFigureOut">
               <a:rPr lang="en-US" smtClean="0"/>
-              <a:t>8/9/2021</a:t>
+              <a:t>8/17/2021</a:t>
             </a:fld>
             <a:endParaRPr lang="en-US"/>
           </a:p>
@@ -1586,7 +1690,7 @@
           <a:p>
             <a:fld id="{D57D165D-784C-428F-B501-6E9E9CABBFA2}" type="datetimeFigureOut">
               <a:rPr lang="en-US" smtClean="0"/>
-              <a:t>8/9/2021</a:t>
+              <a:t>8/17/2021</a:t>
             </a:fld>
             <a:endParaRPr lang="en-US"/>
           </a:p>
@@ -1851,7 +1955,7 @@
           <a:p>
             <a:fld id="{D57D165D-784C-428F-B501-6E9E9CABBFA2}" type="datetimeFigureOut">
               <a:rPr lang="en-US" smtClean="0"/>
-              <a:t>8/9/2021</a:t>
+              <a:t>8/17/2021</a:t>
             </a:fld>
             <a:endParaRPr lang="en-US"/>
           </a:p>
@@ -2263,7 +2367,7 @@
           <a:p>
             <a:fld id="{D57D165D-784C-428F-B501-6E9E9CABBFA2}" type="datetimeFigureOut">
               <a:rPr lang="en-US" smtClean="0"/>
-              <a:t>8/9/2021</a:t>
+              <a:t>8/17/2021</a:t>
             </a:fld>
             <a:endParaRPr lang="en-US"/>
           </a:p>
@@ -2404,7 +2508,7 @@
           <a:p>
             <a:fld id="{D57D165D-784C-428F-B501-6E9E9CABBFA2}" type="datetimeFigureOut">
               <a:rPr lang="en-US" smtClean="0"/>
-              <a:t>8/9/2021</a:t>
+              <a:t>8/17/2021</a:t>
             </a:fld>
             <a:endParaRPr lang="en-US"/>
           </a:p>
@@ -2517,7 +2621,7 @@
           <a:p>
             <a:fld id="{D57D165D-784C-428F-B501-6E9E9CABBFA2}" type="datetimeFigureOut">
               <a:rPr lang="en-US" smtClean="0"/>
-              <a:t>8/9/2021</a:t>
+              <a:t>8/17/2021</a:t>
             </a:fld>
             <a:endParaRPr lang="en-US"/>
           </a:p>
@@ -2828,7 +2932,7 @@
           <a:p>
             <a:fld id="{D57D165D-784C-428F-B501-6E9E9CABBFA2}" type="datetimeFigureOut">
               <a:rPr lang="en-US" smtClean="0"/>
-              <a:t>8/9/2021</a:t>
+              <a:t>8/17/2021</a:t>
             </a:fld>
             <a:endParaRPr lang="en-US"/>
           </a:p>
@@ -3116,7 +3220,7 @@
           <a:p>
             <a:fld id="{D57D165D-784C-428F-B501-6E9E9CABBFA2}" type="datetimeFigureOut">
               <a:rPr lang="en-US" smtClean="0"/>
-              <a:t>8/9/2021</a:t>
+              <a:t>8/17/2021</a:t>
             </a:fld>
             <a:endParaRPr lang="en-US"/>
           </a:p>
@@ -3357,7 +3461,7 @@
           <a:p>
             <a:fld id="{D57D165D-784C-428F-B501-6E9E9CABBFA2}" type="datetimeFigureOut">
               <a:rPr lang="en-US" smtClean="0"/>
-              <a:t>8/9/2021</a:t>
+              <a:t>8/17/2021</a:t>
             </a:fld>
             <a:endParaRPr lang="en-US"/>
           </a:p>
@@ -3850,6 +3954,623 @@
 </file>
 
 <file path=ppt/slides/slide10.xml><?xml version="1.0" encoding="utf-8"?>
+<p:sld xmlns:a="http://schemas.openxmlformats.org/drawingml/2006/main" xmlns:r="http://schemas.openxmlformats.org/officeDocument/2006/relationships" xmlns:p="http://schemas.openxmlformats.org/presentationml/2006/main">
+  <p:cSld>
+    <p:bg>
+      <p:bgPr>
+        <a:solidFill>
+          <a:schemeClr val="bg1">
+            <a:lumMod val="85000"/>
+          </a:schemeClr>
+        </a:solidFill>
+        <a:effectLst/>
+      </p:bgPr>
+    </p:bg>
+    <p:spTree>
+      <p:nvGrpSpPr>
+        <p:cNvPr id="1" name=""/>
+        <p:cNvGrpSpPr/>
+        <p:nvPr/>
+      </p:nvGrpSpPr>
+      <p:grpSpPr>
+        <a:xfrm>
+          <a:off x="0" y="0"/>
+          <a:ext cx="0" cy="0"/>
+          <a:chOff x="0" y="0"/>
+          <a:chExt cx="0" cy="0"/>
+        </a:xfrm>
+      </p:grpSpPr>
+      <p:sp>
+        <p:nvSpPr>
+          <p:cNvPr id="2" name="Title 1">
+            <a:extLst>
+              <a:ext uri="{FF2B5EF4-FFF2-40B4-BE49-F238E27FC236}">
+                <a16:creationId xmlns:a16="http://schemas.microsoft.com/office/drawing/2014/main" id="{E2F8D61A-151A-41D4-ACD1-C7ACE57DA0FE}"/>
+              </a:ext>
+            </a:extLst>
+          </p:cNvPr>
+          <p:cNvSpPr>
+            <a:spLocks noGrp="1"/>
+          </p:cNvSpPr>
+          <p:nvPr>
+            <p:ph type="title"/>
+          </p:nvPr>
+        </p:nvSpPr>
+        <p:spPr/>
+        <p:txBody>
+          <a:bodyPr/>
+          <a:lstStyle/>
+          <a:p>
+            <a:r>
+              <a:rPr lang="en-US" dirty="0"/>
+              <a:t>Database v3 </a:t>
+            </a:r>
+            <a:r>
+              <a:rPr lang="en-US" sz="2400" dirty="0"/>
+              <a:t>(8/17/2021)</a:t>
+            </a:r>
+            <a:endParaRPr lang="en-US" dirty="0"/>
+          </a:p>
+        </p:txBody>
+      </p:sp>
+      <p:sp>
+        <p:nvSpPr>
+          <p:cNvPr id="3" name="Content Placeholder 2">
+            <a:extLst>
+              <a:ext uri="{FF2B5EF4-FFF2-40B4-BE49-F238E27FC236}">
+                <a16:creationId xmlns:a16="http://schemas.microsoft.com/office/drawing/2014/main" id="{471E5327-8ED1-4525-8025-0617F94784D2}"/>
+              </a:ext>
+            </a:extLst>
+          </p:cNvPr>
+          <p:cNvSpPr>
+            <a:spLocks noGrp="1"/>
+          </p:cNvSpPr>
+          <p:nvPr>
+            <p:ph idx="1"/>
+          </p:nvPr>
+        </p:nvSpPr>
+        <p:spPr>
+          <a:xfrm>
+            <a:off x="838200" y="1359281"/>
+            <a:ext cx="10515600" cy="3933265"/>
+          </a:xfrm>
+        </p:spPr>
+        <p:txBody>
+          <a:bodyPr numCol="2">
+            <a:normAutofit/>
+          </a:bodyPr>
+          <a:lstStyle/>
+          <a:p>
+            <a:r>
+              <a:rPr lang="en-US" sz="1000" dirty="0"/>
+              <a:t>User table</a:t>
+            </a:r>
+          </a:p>
+          <a:p>
+            <a:pPr lvl="1"/>
+            <a:r>
+              <a:rPr lang="en-US" sz="900" dirty="0"/>
+              <a:t>Username</a:t>
+            </a:r>
+          </a:p>
+          <a:p>
+            <a:pPr lvl="1"/>
+            <a:r>
+              <a:rPr lang="en-US" sz="900" dirty="0"/>
+              <a:t>Email</a:t>
+            </a:r>
+          </a:p>
+          <a:p>
+            <a:pPr lvl="1"/>
+            <a:r>
+              <a:rPr lang="en-US" sz="900" dirty="0"/>
+              <a:t>Password</a:t>
+            </a:r>
+          </a:p>
+          <a:p>
+            <a:pPr lvl="1"/>
+            <a:r>
+              <a:rPr lang="en-US" sz="900" dirty="0"/>
+              <a:t>Permission (view nick’s data?)</a:t>
+            </a:r>
+          </a:p>
+          <a:p>
+            <a:pPr lvl="1"/>
+            <a:r>
+              <a:rPr lang="en-US" sz="900" dirty="0"/>
+              <a:t>Profile image</a:t>
+            </a:r>
+          </a:p>
+          <a:p>
+            <a:pPr lvl="1"/>
+            <a:r>
+              <a:rPr lang="en-US" sz="900" dirty="0"/>
+              <a:t>Time stamp registered</a:t>
+            </a:r>
+          </a:p>
+          <a:p>
+            <a:pPr lvl="1"/>
+            <a:r>
+              <a:rPr lang="en-US" sz="900" dirty="0"/>
+              <a:t>User </a:t>
+            </a:r>
+            <a:r>
+              <a:rPr lang="en-US" sz="900" dirty="0" err="1"/>
+              <a:t>timezone</a:t>
+            </a:r>
+            <a:endParaRPr lang="en-US" sz="900" dirty="0"/>
+          </a:p>
+          <a:p>
+            <a:r>
+              <a:rPr lang="en-US" sz="1000" dirty="0"/>
+              <a:t>Posts Table</a:t>
+            </a:r>
+          </a:p>
+          <a:p>
+            <a:r>
+              <a:rPr lang="en-US" sz="1000" dirty="0" err="1"/>
+              <a:t>Health_description</a:t>
+            </a:r>
+            <a:endParaRPr lang="en-US" sz="1000" dirty="0"/>
+          </a:p>
+          <a:p>
+            <a:pPr lvl="1"/>
+            <a:r>
+              <a:rPr lang="en-US" sz="900" dirty="0"/>
+              <a:t>Id</a:t>
+            </a:r>
+          </a:p>
+          <a:p>
+            <a:pPr lvl="1"/>
+            <a:r>
+              <a:rPr lang="en-US" sz="900" dirty="0" err="1"/>
+              <a:t>User_id</a:t>
+            </a:r>
+            <a:r>
+              <a:rPr lang="en-US" sz="900" dirty="0"/>
+              <a:t>(foreign key)</a:t>
+            </a:r>
+          </a:p>
+          <a:p>
+            <a:pPr lvl="1"/>
+            <a:r>
+              <a:rPr lang="en-US" sz="900" dirty="0"/>
+              <a:t>Var activity (walking, running, empty is okay for something like mood)</a:t>
+            </a:r>
+          </a:p>
+          <a:p>
+            <a:pPr lvl="1"/>
+            <a:r>
+              <a:rPr lang="en-US" sz="900" dirty="0" err="1"/>
+              <a:t>var_type</a:t>
+            </a:r>
+            <a:r>
+              <a:rPr lang="en-US" sz="900" dirty="0"/>
+              <a:t> (mood, weight, heart rate (instance), etc.,) – LB standardized</a:t>
+            </a:r>
+          </a:p>
+          <a:p>
+            <a:pPr lvl="1"/>
+            <a:r>
+              <a:rPr lang="en-US" sz="900" dirty="0" err="1"/>
+              <a:t>Var_periodicity</a:t>
+            </a:r>
+            <a:r>
+              <a:rPr lang="en-US" sz="900" dirty="0"/>
+              <a:t> – days, seconds (</a:t>
+            </a:r>
+            <a:r>
+              <a:rPr lang="en-US" sz="900" dirty="0" err="1"/>
+              <a:t>i.e</a:t>
+            </a:r>
+            <a:r>
+              <a:rPr lang="en-US" sz="900" dirty="0"/>
+              <a:t> what are the measurements in – maybe redundant to </a:t>
+            </a:r>
+            <a:r>
+              <a:rPr lang="en-US" sz="900" dirty="0" err="1"/>
+              <a:t>var_unit</a:t>
+            </a:r>
+            <a:r>
+              <a:rPr lang="en-US" sz="900" dirty="0"/>
+              <a:t>?)</a:t>
+            </a:r>
+          </a:p>
+          <a:p>
+            <a:pPr lvl="1"/>
+            <a:r>
+              <a:rPr lang="en-US" sz="900" dirty="0" err="1"/>
+              <a:t>var_unit</a:t>
+            </a:r>
+            <a:r>
+              <a:rPr lang="en-US" sz="900" dirty="0"/>
+              <a:t>– LB will standardize across data sets</a:t>
+            </a:r>
+          </a:p>
+          <a:p>
+            <a:pPr lvl="1"/>
+            <a:r>
+              <a:rPr lang="en-US" sz="900" dirty="0" err="1"/>
+              <a:t>var_timezone_utc_delta_in_mins</a:t>
+            </a:r>
+            <a:r>
+              <a:rPr lang="en-US" sz="900" dirty="0"/>
+              <a:t> = </a:t>
+            </a:r>
+            <a:r>
+              <a:rPr lang="en-US" sz="900" dirty="0" err="1"/>
+              <a:t>db.Column</a:t>
+            </a:r>
+            <a:r>
+              <a:rPr lang="en-US" sz="900" dirty="0"/>
+              <a:t>(</a:t>
+            </a:r>
+            <a:r>
+              <a:rPr lang="en-US" sz="900" dirty="0" err="1"/>
+              <a:t>db.Float</a:t>
+            </a:r>
+            <a:r>
+              <a:rPr lang="en-US" sz="900" dirty="0"/>
+              <a:t>) #difference </a:t>
+            </a:r>
+            <a:r>
+              <a:rPr lang="en-US" sz="900" dirty="0" err="1"/>
+              <a:t>bewteen</a:t>
+            </a:r>
+            <a:r>
+              <a:rPr lang="en-US" sz="900" dirty="0"/>
+              <a:t> </a:t>
+            </a:r>
+            <a:r>
+              <a:rPr lang="en-US" sz="900" dirty="0" err="1"/>
+              <a:t>utc</a:t>
+            </a:r>
+            <a:r>
+              <a:rPr lang="en-US" sz="900" dirty="0"/>
+              <a:t> and </a:t>
+            </a:r>
+            <a:r>
+              <a:rPr lang="en-US" sz="900" dirty="0" err="1"/>
+              <a:t>timezone</a:t>
+            </a:r>
+            <a:r>
+              <a:rPr lang="en-US" sz="900" dirty="0"/>
+              <a:t> of exercise</a:t>
+            </a:r>
+          </a:p>
+          <a:p>
+            <a:pPr lvl="1"/>
+            <a:r>
+              <a:rPr lang="en-US" sz="900" dirty="0" err="1"/>
+              <a:t>time_stamp_utc</a:t>
+            </a:r>
+            <a:r>
+              <a:rPr lang="en-US" sz="900" dirty="0"/>
+              <a:t> – time stamp of entry </a:t>
+            </a:r>
+          </a:p>
+          <a:p>
+            <a:pPr lvl="1"/>
+            <a:r>
+              <a:rPr lang="en-US" sz="900" dirty="0">
+                <a:highlight>
+                  <a:srgbClr val="FFFF00"/>
+                </a:highlight>
+              </a:rPr>
+              <a:t>Duration of workout (in seconds )</a:t>
+            </a:r>
+          </a:p>
+          <a:p>
+            <a:pPr lvl="1"/>
+            <a:r>
+              <a:rPr lang="en-US" sz="900" dirty="0"/>
+              <a:t>Metric1_cardio</a:t>
+            </a:r>
+          </a:p>
+          <a:p>
+            <a:pPr lvl="1"/>
+            <a:r>
+              <a:rPr lang="en-US" sz="900" dirty="0"/>
+              <a:t>Metric2</a:t>
+            </a:r>
+          </a:p>
+          <a:p>
+            <a:pPr lvl="1"/>
+            <a:r>
+              <a:rPr lang="en-US" sz="900" dirty="0"/>
+              <a:t>Metric3</a:t>
+            </a:r>
+          </a:p>
+          <a:p>
+            <a:pPr lvl="1"/>
+            <a:r>
+              <a:rPr lang="en-US" sz="900" dirty="0"/>
+              <a:t>Metric4</a:t>
+            </a:r>
+          </a:p>
+          <a:p>
+            <a:pPr lvl="1"/>
+            <a:r>
+              <a:rPr lang="en-US" sz="900" dirty="0"/>
+              <a:t>metric5</a:t>
+            </a:r>
+          </a:p>
+          <a:p>
+            <a:endParaRPr lang="en-US" sz="1000" dirty="0"/>
+          </a:p>
+          <a:p>
+            <a:r>
+              <a:rPr lang="en-US" sz="1000" dirty="0" err="1"/>
+              <a:t>Health_measure</a:t>
+            </a:r>
+            <a:endParaRPr lang="en-US" sz="1000" dirty="0"/>
+          </a:p>
+          <a:p>
+            <a:pPr lvl="1"/>
+            <a:r>
+              <a:rPr lang="en-US" sz="900" dirty="0"/>
+              <a:t>Id</a:t>
+            </a:r>
+          </a:p>
+          <a:p>
+            <a:pPr lvl="1"/>
+            <a:r>
+              <a:rPr lang="en-US" sz="900" dirty="0" err="1"/>
+              <a:t>description_id</a:t>
+            </a:r>
+            <a:r>
+              <a:rPr lang="en-US" sz="900" dirty="0"/>
+              <a:t> (foreign key)</a:t>
+            </a:r>
+          </a:p>
+          <a:p>
+            <a:pPr lvl="1"/>
+            <a:r>
+              <a:rPr lang="en-US" sz="900" dirty="0" err="1"/>
+              <a:t>var_datetime_utc</a:t>
+            </a:r>
+            <a:r>
+              <a:rPr lang="en-US" sz="900" dirty="0"/>
+              <a:t>  (Date, hour, min, sec converted to </a:t>
+            </a:r>
+            <a:r>
+              <a:rPr lang="en-US" sz="900" dirty="0" err="1"/>
+              <a:t>utc</a:t>
+            </a:r>
+            <a:r>
+              <a:rPr lang="en-US" sz="900" dirty="0"/>
+              <a:t>)</a:t>
+            </a:r>
+          </a:p>
+          <a:p>
+            <a:pPr lvl="1"/>
+            <a:r>
+              <a:rPr lang="en-US" sz="900" dirty="0" err="1"/>
+              <a:t>Var_value</a:t>
+            </a:r>
+            <a:r>
+              <a:rPr lang="en-US" sz="900" dirty="0"/>
+              <a:t> [measurement]</a:t>
+            </a:r>
+          </a:p>
+          <a:p>
+            <a:pPr lvl="1"/>
+            <a:r>
+              <a:rPr lang="en-US" sz="900" dirty="0" err="1">
+                <a:highlight>
+                  <a:srgbClr val="FFFF00"/>
+                </a:highlight>
+              </a:rPr>
+              <a:t>Var_unit</a:t>
+            </a:r>
+            <a:endParaRPr lang="en-US" sz="900" dirty="0">
+              <a:highlight>
+                <a:srgbClr val="FFFF00"/>
+              </a:highlight>
+            </a:endParaRPr>
+          </a:p>
+          <a:p>
+            <a:pPr lvl="1"/>
+            <a:r>
+              <a:rPr lang="en-US" sz="900" dirty="0" err="1">
+                <a:highlight>
+                  <a:srgbClr val="FFFF00"/>
+                </a:highlight>
+              </a:rPr>
+              <a:t>Var_type</a:t>
+            </a:r>
+            <a:r>
+              <a:rPr lang="en-US" sz="900">
+                <a:highlight>
+                  <a:srgbClr val="FFFF00"/>
+                </a:highlight>
+              </a:rPr>
+              <a:t> - Type </a:t>
+            </a:r>
+            <a:r>
+              <a:rPr lang="en-US" sz="900" dirty="0">
+                <a:highlight>
+                  <a:srgbClr val="FFFF00"/>
+                </a:highlight>
+              </a:rPr>
+              <a:t>of measure (heart rate, time, speed, etc.)</a:t>
+            </a:r>
+          </a:p>
+          <a:p>
+            <a:pPr lvl="1"/>
+            <a:endParaRPr lang="en-US" sz="900" dirty="0">
+              <a:highlight>
+                <a:srgbClr val="FFFF00"/>
+              </a:highlight>
+            </a:endParaRPr>
+          </a:p>
+          <a:p>
+            <a:pPr lvl="1"/>
+            <a:endParaRPr lang="en-US" sz="900" dirty="0"/>
+          </a:p>
+        </p:txBody>
+      </p:sp>
+      <p:sp>
+        <p:nvSpPr>
+          <p:cNvPr id="4" name="TextBox 3">
+            <a:extLst>
+              <a:ext uri="{FF2B5EF4-FFF2-40B4-BE49-F238E27FC236}">
+                <a16:creationId xmlns:a16="http://schemas.microsoft.com/office/drawing/2014/main" id="{16AC410D-4FDE-4ECD-8104-91DD87EC4AB5}"/>
+              </a:ext>
+            </a:extLst>
+          </p:cNvPr>
+          <p:cNvSpPr txBox="1"/>
+          <p:nvPr/>
+        </p:nvSpPr>
+        <p:spPr>
+          <a:xfrm>
+            <a:off x="335280" y="5292546"/>
+            <a:ext cx="5590032" cy="1200329"/>
+          </a:xfrm>
+          <a:prstGeom prst="rect">
+            <a:avLst/>
+          </a:prstGeom>
+          <a:noFill/>
+        </p:spPr>
+        <p:txBody>
+          <a:bodyPr wrap="square" rtlCol="0">
+            <a:spAutoFit/>
+          </a:bodyPr>
+          <a:lstStyle/>
+          <a:p>
+            <a:r>
+              <a:rPr lang="en-US" dirty="0"/>
+              <a:t>Data upload processing steps:</a:t>
+            </a:r>
+          </a:p>
+          <a:p>
+            <a:pPr marL="342900" indent="-342900">
+              <a:buFont typeface="+mj-lt"/>
+              <a:buAutoNum type="arabicPeriod"/>
+            </a:pPr>
+            <a:r>
+              <a:rPr lang="en-US" dirty="0"/>
+              <a:t>Data gets uploaded through web or phone app. </a:t>
+            </a:r>
+          </a:p>
+          <a:p>
+            <a:pPr marL="342900" indent="-342900">
+              <a:buFont typeface="+mj-lt"/>
+              <a:buAutoNum type="arabicPeriod"/>
+            </a:pPr>
+            <a:r>
+              <a:rPr lang="en-US" dirty="0"/>
+              <a:t>Backend converts the input data to fit in Variable table via pandas </a:t>
+            </a:r>
+            <a:r>
+              <a:rPr lang="en-US" dirty="0" err="1"/>
+              <a:t>dataframe</a:t>
+            </a:r>
+            <a:r>
+              <a:rPr lang="en-US" dirty="0"/>
+              <a:t>. </a:t>
+            </a:r>
+          </a:p>
+        </p:txBody>
+      </p:sp>
+      <p:sp>
+        <p:nvSpPr>
+          <p:cNvPr id="5" name="TextBox 4">
+            <a:extLst>
+              <a:ext uri="{FF2B5EF4-FFF2-40B4-BE49-F238E27FC236}">
+                <a16:creationId xmlns:a16="http://schemas.microsoft.com/office/drawing/2014/main" id="{E2302978-4299-4BE6-87E5-0A396DEBDAD0}"/>
+              </a:ext>
+            </a:extLst>
+          </p:cNvPr>
+          <p:cNvSpPr txBox="1"/>
+          <p:nvPr/>
+        </p:nvSpPr>
+        <p:spPr>
+          <a:xfrm>
+            <a:off x="6275832" y="5310834"/>
+            <a:ext cx="5580888" cy="1200329"/>
+          </a:xfrm>
+          <a:prstGeom prst="rect">
+            <a:avLst/>
+          </a:prstGeom>
+          <a:noFill/>
+        </p:spPr>
+        <p:txBody>
+          <a:bodyPr wrap="square" rtlCol="0">
+            <a:spAutoFit/>
+          </a:bodyPr>
+          <a:lstStyle/>
+          <a:p>
+            <a:r>
+              <a:rPr lang="en-US" dirty="0"/>
+              <a:t>Data report processing steps:</a:t>
+            </a:r>
+          </a:p>
+          <a:p>
+            <a:pPr marL="342900" indent="-342900">
+              <a:buFont typeface="+mj-lt"/>
+              <a:buAutoNum type="arabicPeriod"/>
+            </a:pPr>
+            <a:r>
+              <a:rPr lang="en-US" dirty="0"/>
+              <a:t>Collect data from database into </a:t>
+            </a:r>
+            <a:r>
+              <a:rPr lang="en-US" dirty="0" err="1"/>
+              <a:t>dataframe</a:t>
+            </a:r>
+            <a:r>
+              <a:rPr lang="en-US" dirty="0"/>
+              <a:t>.</a:t>
+            </a:r>
+          </a:p>
+          <a:p>
+            <a:pPr marL="342900" indent="-342900">
+              <a:buFont typeface="+mj-lt"/>
+              <a:buAutoNum type="arabicPeriod"/>
+            </a:pPr>
+            <a:r>
+              <a:rPr lang="en-US" dirty="0"/>
+              <a:t>Convert </a:t>
+            </a:r>
+            <a:r>
+              <a:rPr lang="en-US" dirty="0" err="1"/>
+              <a:t>dataframe</a:t>
+            </a:r>
+            <a:r>
+              <a:rPr lang="en-US" dirty="0"/>
+              <a:t> to format for chart, table or </a:t>
+            </a:r>
+            <a:r>
+              <a:rPr lang="en-US" dirty="0" err="1"/>
+              <a:t>excelt</a:t>
+            </a:r>
+            <a:r>
+              <a:rPr lang="en-US" dirty="0"/>
+              <a:t> </a:t>
+            </a:r>
+            <a:r>
+              <a:rPr lang="en-US"/>
+              <a:t>report.</a:t>
+            </a:r>
+            <a:endParaRPr lang="en-US" dirty="0"/>
+          </a:p>
+        </p:txBody>
+      </p:sp>
+    </p:spTree>
+    <p:extLst>
+      <p:ext uri="{BB962C8B-B14F-4D97-AF65-F5344CB8AC3E}">
+        <p14:creationId xmlns:p14="http://schemas.microsoft.com/office/powerpoint/2010/main" val="2460427629"/>
+      </p:ext>
+    </p:extLst>
+  </p:cSld>
+  <p:clrMapOvr>
+    <a:masterClrMapping/>
+  </p:clrMapOvr>
+</p:sld>
+</file>
+
+<file path=ppt/slides/slide11.xml><?xml version="1.0" encoding="utf-8"?>
 <p:sld xmlns:a="http://schemas.openxmlformats.org/drawingml/2006/main" xmlns:r="http://schemas.openxmlformats.org/officeDocument/2006/relationships" xmlns:p="http://schemas.openxmlformats.org/presentationml/2006/main">
   <p:cSld>
     <p:spTree>
@@ -5011,6 +5732,302 @@
 </p:sld>
 </file>
 
+<file path=ppt/slides/slide12.xml><?xml version="1.0" encoding="utf-8"?>
+<p:sld xmlns:a="http://schemas.openxmlformats.org/drawingml/2006/main" xmlns:r="http://schemas.openxmlformats.org/officeDocument/2006/relationships" xmlns:p="http://schemas.openxmlformats.org/presentationml/2006/main">
+  <p:cSld>
+    <p:spTree>
+      <p:nvGrpSpPr>
+        <p:cNvPr id="1" name=""/>
+        <p:cNvGrpSpPr/>
+        <p:nvPr/>
+      </p:nvGrpSpPr>
+      <p:grpSpPr>
+        <a:xfrm>
+          <a:off x="0" y="0"/>
+          <a:ext cx="0" cy="0"/>
+          <a:chOff x="0" y="0"/>
+          <a:chExt cx="0" cy="0"/>
+        </a:xfrm>
+      </p:grpSpPr>
+      <p:sp>
+        <p:nvSpPr>
+          <p:cNvPr id="2" name="Title 1">
+            <a:extLst>
+              <a:ext uri="{FF2B5EF4-FFF2-40B4-BE49-F238E27FC236}">
+                <a16:creationId xmlns:a16="http://schemas.microsoft.com/office/drawing/2014/main" id="{9732167D-70E6-492E-8CD4-228276C98778}"/>
+              </a:ext>
+            </a:extLst>
+          </p:cNvPr>
+          <p:cNvSpPr>
+            <a:spLocks noGrp="1"/>
+          </p:cNvSpPr>
+          <p:nvPr>
+            <p:ph type="title"/>
+          </p:nvPr>
+        </p:nvSpPr>
+        <p:spPr/>
+        <p:txBody>
+          <a:bodyPr/>
+          <a:lstStyle/>
+          <a:p>
+            <a:r>
+              <a:rPr lang="en-US" dirty="0"/>
+              <a:t>Heart Rate Model 8/17/2021</a:t>
+            </a:r>
+            <a:br>
+              <a:rPr lang="en-US" dirty="0"/>
+            </a:br>
+            <a:r>
+              <a:rPr lang="en-US" dirty="0"/>
+              <a:t>Michaelis-M Equation</a:t>
+            </a:r>
+          </a:p>
+        </p:txBody>
+      </p:sp>
+      <mc:AlternateContent xmlns:mc="http://schemas.openxmlformats.org/markup-compatibility/2006">
+        <mc:Choice xmlns:a14="http://schemas.microsoft.com/office/drawing/2010/main" Requires="a14">
+          <p:sp>
+            <p:nvSpPr>
+              <p:cNvPr id="3" name="Content Placeholder 2">
+                <a:extLst>
+                  <a:ext uri="{FF2B5EF4-FFF2-40B4-BE49-F238E27FC236}">
+                    <a16:creationId xmlns:a16="http://schemas.microsoft.com/office/drawing/2014/main" id="{AC3D23B7-A69F-4034-971F-9EFCD31B22C3}"/>
+                  </a:ext>
+                </a:extLst>
+              </p:cNvPr>
+              <p:cNvSpPr>
+                <a:spLocks noGrp="1"/>
+              </p:cNvSpPr>
+              <p:nvPr>
+                <p:ph idx="1"/>
+              </p:nvPr>
+            </p:nvSpPr>
+            <p:spPr>
+              <a:xfrm>
+                <a:off x="3251200" y="2625725"/>
+                <a:ext cx="4089400" cy="984687"/>
+              </a:xfrm>
+            </p:spPr>
+            <p:txBody>
+              <a:bodyPr>
+                <a:normAutofit/>
+              </a:bodyPr>
+              <a:lstStyle/>
+              <a:p>
+                <a:pPr marL="0" indent="0">
+                  <a:buNone/>
+                </a:pPr>
+                <a14:m>
+                  <m:oMathPara xmlns:m="http://schemas.openxmlformats.org/officeDocument/2006/math">
+                    <m:oMathParaPr>
+                      <m:jc m:val="centerGroup"/>
+                    </m:oMathParaPr>
+                    <m:oMath xmlns:m="http://schemas.openxmlformats.org/officeDocument/2006/math">
+                      <m:f>
+                        <m:fPr>
+                          <m:ctrlPr>
+                            <a:rPr lang="en-US" i="1"/>
+                          </m:ctrlPr>
+                        </m:fPr>
+                        <m:num>
+                          <m:r>
+                            <a:rPr lang="en-US" i="1"/>
+                            <m:t>𝑎𝑋</m:t>
+                          </m:r>
+                        </m:num>
+                        <m:den>
+                          <m:r>
+                            <a:rPr lang="en-US" i="1"/>
+                            <m:t>𝑏</m:t>
+                          </m:r>
+                          <m:r>
+                            <a:rPr lang="en-US" i="1"/>
+                            <m:t>+</m:t>
+                          </m:r>
+                          <m:r>
+                            <a:rPr lang="en-US" i="1"/>
+                            <m:t>𝑋</m:t>
+                          </m:r>
+                        </m:den>
+                      </m:f>
+                    </m:oMath>
+                  </m:oMathPara>
+                </a14:m>
+                <a:endParaRPr lang="en-US" dirty="0"/>
+              </a:p>
+            </p:txBody>
+          </p:sp>
+        </mc:Choice>
+        <mc:Fallback>
+          <p:sp>
+            <p:nvSpPr>
+              <p:cNvPr id="3" name="Content Placeholder 2">
+                <a:extLst>
+                  <a:ext uri="{FF2B5EF4-FFF2-40B4-BE49-F238E27FC236}">
+                    <a16:creationId xmlns:a16="http://schemas.microsoft.com/office/drawing/2014/main" id="{AC3D23B7-A69F-4034-971F-9EFCD31B22C3}"/>
+                  </a:ext>
+                </a:extLst>
+              </p:cNvPr>
+              <p:cNvSpPr>
+                <a:spLocks noGrp="1" noRot="1" noChangeAspect="1" noMove="1" noResize="1" noEditPoints="1" noAdjustHandles="1" noChangeArrowheads="1" noChangeShapeType="1" noTextEdit="1"/>
+              </p:cNvSpPr>
+              <p:nvPr>
+                <p:ph idx="1"/>
+              </p:nvPr>
+            </p:nvSpPr>
+            <p:spPr>
+              <a:xfrm>
+                <a:off x="3251200" y="2625725"/>
+                <a:ext cx="4089400" cy="984687"/>
+              </a:xfrm>
+              <a:blipFill>
+                <a:blip r:embed="rId2"/>
+                <a:stretch>
+                  <a:fillRect/>
+                </a:stretch>
+              </a:blipFill>
+            </p:spPr>
+            <p:txBody>
+              <a:bodyPr/>
+              <a:lstStyle/>
+              <a:p>
+                <a:r>
+                  <a:rPr lang="en-US">
+                    <a:noFill/>
+                  </a:rPr>
+                  <a:t> </a:t>
+                </a:r>
+              </a:p>
+            </p:txBody>
+          </p:sp>
+        </mc:Fallback>
+      </mc:AlternateContent>
+      <p:sp>
+        <p:nvSpPr>
+          <p:cNvPr id="4" name="TextBox 3">
+            <a:extLst>
+              <a:ext uri="{FF2B5EF4-FFF2-40B4-BE49-F238E27FC236}">
+                <a16:creationId xmlns:a16="http://schemas.microsoft.com/office/drawing/2014/main" id="{16A92D4A-C192-498A-9AF5-165CBA52D7AF}"/>
+              </a:ext>
+            </a:extLst>
+          </p:cNvPr>
+          <p:cNvSpPr txBox="1"/>
+          <p:nvPr/>
+        </p:nvSpPr>
+        <p:spPr>
+          <a:xfrm>
+            <a:off x="1231900" y="4572000"/>
+            <a:ext cx="6299200" cy="1477328"/>
+          </a:xfrm>
+          <a:prstGeom prst="rect">
+            <a:avLst/>
+          </a:prstGeom>
+          <a:noFill/>
+        </p:spPr>
+        <p:txBody>
+          <a:bodyPr wrap="square" rtlCol="0">
+            <a:spAutoFit/>
+          </a:bodyPr>
+          <a:lstStyle/>
+          <a:p>
+            <a:pPr marL="0" marR="0">
+              <a:spcBef>
+                <a:spcPts val="0"/>
+              </a:spcBef>
+              <a:spcAft>
+                <a:spcPts val="0"/>
+              </a:spcAft>
+            </a:pPr>
+            <a:r>
+              <a:rPr lang="en-US" sz="1800" dirty="0">
+                <a:effectLst/>
+                <a:latin typeface="Calibri" panose="020F0502020204030204" pitchFamily="34" charset="0"/>
+                <a:ea typeface="Calibri" panose="020F0502020204030204" pitchFamily="34" charset="0"/>
+                <a:cs typeface="Times New Roman" panose="02020603050405020304" pitchFamily="18" charset="0"/>
+              </a:rPr>
+              <a:t>Where,</a:t>
+            </a:r>
+          </a:p>
+          <a:p>
+            <a:pPr marL="0" marR="0">
+              <a:spcBef>
+                <a:spcPts val="0"/>
+              </a:spcBef>
+              <a:spcAft>
+                <a:spcPts val="0"/>
+              </a:spcAft>
+            </a:pPr>
+            <a:r>
+              <a:rPr lang="en-US" sz="1800" dirty="0">
+                <a:effectLst/>
+                <a:latin typeface="Calibri" panose="020F0502020204030204" pitchFamily="34" charset="0"/>
+                <a:ea typeface="Calibri" panose="020F0502020204030204" pitchFamily="34" charset="0"/>
+                <a:cs typeface="Times New Roman" panose="02020603050405020304" pitchFamily="18" charset="0"/>
+              </a:rPr>
+              <a:t>	a= is the maximum heart rate</a:t>
+            </a:r>
+          </a:p>
+          <a:p>
+            <a:pPr marL="0" marR="0">
+              <a:spcBef>
+                <a:spcPts val="0"/>
+              </a:spcBef>
+              <a:spcAft>
+                <a:spcPts val="0"/>
+              </a:spcAft>
+            </a:pPr>
+            <a:r>
+              <a:rPr lang="en-US" sz="1800" dirty="0">
+                <a:effectLst/>
+                <a:latin typeface="Calibri" panose="020F0502020204030204" pitchFamily="34" charset="0"/>
+                <a:ea typeface="Calibri" panose="020F0502020204030204" pitchFamily="34" charset="0"/>
+                <a:cs typeface="Times New Roman" panose="02020603050405020304" pitchFamily="18" charset="0"/>
+              </a:rPr>
+              <a:t>	b=shape parameter of the training session</a:t>
+            </a:r>
+          </a:p>
+          <a:p>
+            <a:pPr marL="0" marR="0">
+              <a:spcBef>
+                <a:spcPts val="0"/>
+              </a:spcBef>
+              <a:spcAft>
+                <a:spcPts val="0"/>
+              </a:spcAft>
+            </a:pPr>
+            <a:r>
+              <a:rPr lang="en-US" dirty="0">
+                <a:latin typeface="Calibri" panose="020F0502020204030204" pitchFamily="34" charset="0"/>
+                <a:ea typeface="Calibri" panose="020F0502020204030204" pitchFamily="34" charset="0"/>
+                <a:cs typeface="Times New Roman" panose="02020603050405020304" pitchFamily="18" charset="0"/>
+              </a:rPr>
+              <a:t>	X=Heart Rate</a:t>
+            </a:r>
+            <a:endParaRPr lang="en-US" sz="1800" dirty="0">
+              <a:effectLst/>
+              <a:latin typeface="Calibri" panose="020F0502020204030204" pitchFamily="34" charset="0"/>
+              <a:ea typeface="Calibri" panose="020F0502020204030204" pitchFamily="34" charset="0"/>
+              <a:cs typeface="Times New Roman" panose="02020603050405020304" pitchFamily="18" charset="0"/>
+            </a:endParaRPr>
+          </a:p>
+          <a:p>
+            <a:endParaRPr lang="en-US" dirty="0"/>
+          </a:p>
+        </p:txBody>
+      </p:sp>
+    </p:spTree>
+    <p:extLst>
+      <p:ext uri="{BB962C8B-B14F-4D97-AF65-F5344CB8AC3E}">
+        <p14:creationId xmlns:p14="http://schemas.microsoft.com/office/powerpoint/2010/main" val="2267054047"/>
+      </p:ext>
+    </p:extLst>
+  </p:cSld>
+  <p:clrMapOvr>
+    <a:masterClrMapping/>
+  </p:clrMapOvr>
+</p:sld>
+</file>
+
 <file path=ppt/slides/slide2.xml><?xml version="1.0" encoding="utf-8"?>
 <p:sld xmlns:a="http://schemas.openxmlformats.org/drawingml/2006/main" xmlns:r="http://schemas.openxmlformats.org/officeDocument/2006/relationships" xmlns:p="http://schemas.openxmlformats.org/presentationml/2006/main">
   <p:cSld>

</xml_diff>